<commit_message>
Lo trabajado en clase el 21/02/2025
</commit_message>
<xml_diff>
--- a/ASIGNATURAS/PM/PRACTICA/Ficheros-de-entregas/Presentacion-Proyecto-Macarena.pptx
+++ b/ASIGNATURAS/PM/PRACTICA/Ficheros-de-entregas/Presentacion-Proyecto-Macarena.pptx
@@ -12,6 +12,20 @@
     <p:sldId id="261" r:id="rId6"/>
     <p:sldId id="262" r:id="rId7"/>
     <p:sldId id="263" r:id="rId8"/>
+    <p:sldId id="264" r:id="rId9"/>
+    <p:sldId id="265" r:id="rId10"/>
+    <p:sldId id="268" r:id="rId11"/>
+    <p:sldId id="266" r:id="rId12"/>
+    <p:sldId id="267" r:id="rId13"/>
+    <p:sldId id="269" r:id="rId14"/>
+    <p:sldId id="270" r:id="rId15"/>
+    <p:sldId id="272" r:id="rId16"/>
+    <p:sldId id="271" r:id="rId17"/>
+    <p:sldId id="273" r:id="rId18"/>
+    <p:sldId id="274" r:id="rId19"/>
+    <p:sldId id="275" r:id="rId20"/>
+    <p:sldId id="276" r:id="rId21"/>
+    <p:sldId id="277" r:id="rId22"/>
   </p:sldIdLst>
   <p:sldSz cx="12192000" cy="6858000"/>
   <p:notesSz cx="6858000" cy="9144000"/>
@@ -110,6 +124,11 @@
       </a:defRPr>
     </a:lvl9pPr>
   </p:defaultTextStyle>
+  <p:extLst>
+    <p:ext uri="{EFAFB233-063F-42B5-8137-9DF3F51BA10A}">
+      <p15:sldGuideLst xmlns:p15="http://schemas.microsoft.com/office/powerpoint/2012/main"/>
+    </p:ext>
+  </p:extLst>
 </p:presentation>
 </file>
 
@@ -244,7 +263,7 @@
           <a:p>
             <a:fld id="{3084FAAB-48E5-491E-985D-A80EB3A63567}" type="datetimeFigureOut">
               <a:rPr lang="es-ES" smtClean="0"/>
-              <a:t>20/02/2025</a:t>
+              <a:t>21/02/2025</a:t>
             </a:fld>
             <a:endParaRPr lang="es-ES"/>
           </a:p>
@@ -414,7 +433,7 @@
           <a:p>
             <a:fld id="{3084FAAB-48E5-491E-985D-A80EB3A63567}" type="datetimeFigureOut">
               <a:rPr lang="es-ES" smtClean="0"/>
-              <a:t>20/02/2025</a:t>
+              <a:t>21/02/2025</a:t>
             </a:fld>
             <a:endParaRPr lang="es-ES"/>
           </a:p>
@@ -594,7 +613,7 @@
           <a:p>
             <a:fld id="{3084FAAB-48E5-491E-985D-A80EB3A63567}" type="datetimeFigureOut">
               <a:rPr lang="es-ES" smtClean="0"/>
-              <a:t>20/02/2025</a:t>
+              <a:t>21/02/2025</a:t>
             </a:fld>
             <a:endParaRPr lang="es-ES"/>
           </a:p>
@@ -764,7 +783,7 @@
           <a:p>
             <a:fld id="{3084FAAB-48E5-491E-985D-A80EB3A63567}" type="datetimeFigureOut">
               <a:rPr lang="es-ES" smtClean="0"/>
-              <a:t>20/02/2025</a:t>
+              <a:t>21/02/2025</a:t>
             </a:fld>
             <a:endParaRPr lang="es-ES"/>
           </a:p>
@@ -1010,7 +1029,7 @@
           <a:p>
             <a:fld id="{3084FAAB-48E5-491E-985D-A80EB3A63567}" type="datetimeFigureOut">
               <a:rPr lang="es-ES" smtClean="0"/>
-              <a:t>20/02/2025</a:t>
+              <a:t>21/02/2025</a:t>
             </a:fld>
             <a:endParaRPr lang="es-ES"/>
           </a:p>
@@ -1242,7 +1261,7 @@
           <a:p>
             <a:fld id="{3084FAAB-48E5-491E-985D-A80EB3A63567}" type="datetimeFigureOut">
               <a:rPr lang="es-ES" smtClean="0"/>
-              <a:t>20/02/2025</a:t>
+              <a:t>21/02/2025</a:t>
             </a:fld>
             <a:endParaRPr lang="es-ES"/>
           </a:p>
@@ -1609,7 +1628,7 @@
           <a:p>
             <a:fld id="{3084FAAB-48E5-491E-985D-A80EB3A63567}" type="datetimeFigureOut">
               <a:rPr lang="es-ES" smtClean="0"/>
-              <a:t>20/02/2025</a:t>
+              <a:t>21/02/2025</a:t>
             </a:fld>
             <a:endParaRPr lang="es-ES"/>
           </a:p>
@@ -1727,7 +1746,7 @@
           <a:p>
             <a:fld id="{3084FAAB-48E5-491E-985D-A80EB3A63567}" type="datetimeFigureOut">
               <a:rPr lang="es-ES" smtClean="0"/>
-              <a:t>20/02/2025</a:t>
+              <a:t>21/02/2025</a:t>
             </a:fld>
             <a:endParaRPr lang="es-ES"/>
           </a:p>
@@ -1822,7 +1841,7 @@
           <a:p>
             <a:fld id="{3084FAAB-48E5-491E-985D-A80EB3A63567}" type="datetimeFigureOut">
               <a:rPr lang="es-ES" smtClean="0"/>
-              <a:t>20/02/2025</a:t>
+              <a:t>21/02/2025</a:t>
             </a:fld>
             <a:endParaRPr lang="es-ES"/>
           </a:p>
@@ -2099,7 +2118,7 @@
           <a:p>
             <a:fld id="{3084FAAB-48E5-491E-985D-A80EB3A63567}" type="datetimeFigureOut">
               <a:rPr lang="es-ES" smtClean="0"/>
-              <a:t>20/02/2025</a:t>
+              <a:t>21/02/2025</a:t>
             </a:fld>
             <a:endParaRPr lang="es-ES"/>
           </a:p>
@@ -2356,7 +2375,7 @@
           <a:p>
             <a:fld id="{3084FAAB-48E5-491E-985D-A80EB3A63567}" type="datetimeFigureOut">
               <a:rPr lang="es-ES" smtClean="0"/>
-              <a:t>20/02/2025</a:t>
+              <a:t>21/02/2025</a:t>
             </a:fld>
             <a:endParaRPr lang="es-ES"/>
           </a:p>
@@ -2569,7 +2588,7 @@
           <a:p>
             <a:fld id="{3084FAAB-48E5-491E-985D-A80EB3A63567}" type="datetimeFigureOut">
               <a:rPr lang="es-ES" smtClean="0"/>
-              <a:t>20/02/2025</a:t>
+              <a:t>21/02/2025</a:t>
             </a:fld>
             <a:endParaRPr lang="es-ES"/>
           </a:p>
@@ -2987,6 +3006,1421 @@
 </p:sld>
 </file>
 
+<file path=ppt/slides/slide10.xml><?xml version="1.0" encoding="utf-8"?>
+<p:sld xmlns:a="http://schemas.openxmlformats.org/drawingml/2006/main" xmlns:r="http://schemas.openxmlformats.org/officeDocument/2006/relationships" xmlns:p="http://schemas.openxmlformats.org/presentationml/2006/main">
+  <p:cSld>
+    <p:spTree>
+      <p:nvGrpSpPr>
+        <p:cNvPr id="1" name="">
+          <a:extLst>
+            <a:ext uri="{FF2B5EF4-FFF2-40B4-BE49-F238E27FC236}">
+              <a16:creationId xmlns:a16="http://schemas.microsoft.com/office/drawing/2014/main" id="{8C95567F-7897-5C38-33E5-DE5C99DDF631}"/>
+            </a:ext>
+          </a:extLst>
+        </p:cNvPr>
+        <p:cNvGrpSpPr/>
+        <p:nvPr/>
+      </p:nvGrpSpPr>
+      <p:grpSpPr>
+        <a:xfrm>
+          <a:off x="0" y="0"/>
+          <a:ext cx="0" cy="0"/>
+          <a:chOff x="0" y="0"/>
+          <a:chExt cx="0" cy="0"/>
+        </a:xfrm>
+      </p:grpSpPr>
+      <p:sp>
+        <p:nvSpPr>
+          <p:cNvPr id="2" name="Título 1">
+            <a:extLst>
+              <a:ext uri="{FF2B5EF4-FFF2-40B4-BE49-F238E27FC236}">
+                <a16:creationId xmlns:a16="http://schemas.microsoft.com/office/drawing/2014/main" id="{9935235E-3E9F-B91A-7FB7-E1E11CB47FB4}"/>
+              </a:ext>
+            </a:extLst>
+          </p:cNvPr>
+          <p:cNvSpPr>
+            <a:spLocks noGrp="1"/>
+          </p:cNvSpPr>
+          <p:nvPr>
+            <p:ph type="title"/>
+          </p:nvPr>
+        </p:nvSpPr>
+        <p:spPr/>
+        <p:txBody>
+          <a:bodyPr/>
+          <a:lstStyle/>
+          <a:p>
+            <a:r>
+              <a:rPr lang="es-ES" dirty="0"/>
+              <a:t>Material 3 – Estructura &amp; </a:t>
+            </a:r>
+            <a:r>
+              <a:rPr lang="es-ES" dirty="0" err="1"/>
+              <a:t>Docs</a:t>
+            </a:r>
+            <a:endParaRPr lang="es-ES" dirty="0"/>
+          </a:p>
+        </p:txBody>
+      </p:sp>
+      <p:pic>
+        <p:nvPicPr>
+          <p:cNvPr id="6" name="Imagen 5">
+            <a:extLst>
+              <a:ext uri="{FF2B5EF4-FFF2-40B4-BE49-F238E27FC236}">
+                <a16:creationId xmlns:a16="http://schemas.microsoft.com/office/drawing/2014/main" id="{358D8980-1B5A-4ECD-E2A6-F162757B7373}"/>
+              </a:ext>
+            </a:extLst>
+          </p:cNvPr>
+          <p:cNvPicPr>
+            <a:picLocks noChangeAspect="1"/>
+          </p:cNvPicPr>
+          <p:nvPr/>
+        </p:nvPicPr>
+        <p:blipFill>
+          <a:blip r:embed="rId2"/>
+          <a:stretch>
+            <a:fillRect/>
+          </a:stretch>
+        </p:blipFill>
+        <p:spPr>
+          <a:xfrm>
+            <a:off x="838200" y="2052445"/>
+            <a:ext cx="2829320" cy="2753109"/>
+          </a:xfrm>
+          <a:prstGeom prst="rect">
+            <a:avLst/>
+          </a:prstGeom>
+        </p:spPr>
+      </p:pic>
+      <p:pic>
+        <p:nvPicPr>
+          <p:cNvPr id="12" name="Imagen 11">
+            <a:extLst>
+              <a:ext uri="{FF2B5EF4-FFF2-40B4-BE49-F238E27FC236}">
+                <a16:creationId xmlns:a16="http://schemas.microsoft.com/office/drawing/2014/main" id="{B0A6EACB-0D5D-3823-922B-C50C59FCB000}"/>
+              </a:ext>
+            </a:extLst>
+          </p:cNvPr>
+          <p:cNvPicPr>
+            <a:picLocks noChangeAspect="1"/>
+          </p:cNvPicPr>
+          <p:nvPr/>
+        </p:nvPicPr>
+        <p:blipFill>
+          <a:blip r:embed="rId3"/>
+          <a:stretch>
+            <a:fillRect/>
+          </a:stretch>
+        </p:blipFill>
+        <p:spPr>
+          <a:xfrm>
+            <a:off x="8270985" y="1663026"/>
+            <a:ext cx="2991267" cy="4829849"/>
+          </a:xfrm>
+          <a:prstGeom prst="rect">
+            <a:avLst/>
+          </a:prstGeom>
+        </p:spPr>
+      </p:pic>
+      <p:pic>
+        <p:nvPicPr>
+          <p:cNvPr id="14" name="Imagen 13">
+            <a:extLst>
+              <a:ext uri="{FF2B5EF4-FFF2-40B4-BE49-F238E27FC236}">
+                <a16:creationId xmlns:a16="http://schemas.microsoft.com/office/drawing/2014/main" id="{6A77A9B9-A3A0-B302-1855-9666299F3F29}"/>
+              </a:ext>
+            </a:extLst>
+          </p:cNvPr>
+          <p:cNvPicPr>
+            <a:picLocks noChangeAspect="1"/>
+          </p:cNvPicPr>
+          <p:nvPr/>
+        </p:nvPicPr>
+        <p:blipFill>
+          <a:blip r:embed="rId4"/>
+          <a:stretch>
+            <a:fillRect/>
+          </a:stretch>
+        </p:blipFill>
+        <p:spPr>
+          <a:xfrm>
+            <a:off x="4114523" y="2800258"/>
+            <a:ext cx="3962953" cy="647790"/>
+          </a:xfrm>
+          <a:prstGeom prst="rect">
+            <a:avLst/>
+          </a:prstGeom>
+        </p:spPr>
+      </p:pic>
+      <p:pic>
+        <p:nvPicPr>
+          <p:cNvPr id="16" name="Imagen 15">
+            <a:extLst>
+              <a:ext uri="{FF2B5EF4-FFF2-40B4-BE49-F238E27FC236}">
+                <a16:creationId xmlns:a16="http://schemas.microsoft.com/office/drawing/2014/main" id="{B315DF4F-807C-F9A0-E58A-5F4E445CA79C}"/>
+              </a:ext>
+            </a:extLst>
+          </p:cNvPr>
+          <p:cNvPicPr>
+            <a:picLocks noChangeAspect="1"/>
+          </p:cNvPicPr>
+          <p:nvPr/>
+        </p:nvPicPr>
+        <p:blipFill>
+          <a:blip r:embed="rId5"/>
+          <a:stretch>
+            <a:fillRect/>
+          </a:stretch>
+        </p:blipFill>
+        <p:spPr>
+          <a:xfrm>
+            <a:off x="4114523" y="1989689"/>
+            <a:ext cx="1629002" cy="657317"/>
+          </a:xfrm>
+          <a:prstGeom prst="rect">
+            <a:avLst/>
+          </a:prstGeom>
+        </p:spPr>
+      </p:pic>
+      <p:pic>
+        <p:nvPicPr>
+          <p:cNvPr id="18" name="Imagen 17">
+            <a:extLst>
+              <a:ext uri="{FF2B5EF4-FFF2-40B4-BE49-F238E27FC236}">
+                <a16:creationId xmlns:a16="http://schemas.microsoft.com/office/drawing/2014/main" id="{57B4BED0-9AB1-632B-9537-00976828E235}"/>
+              </a:ext>
+            </a:extLst>
+          </p:cNvPr>
+          <p:cNvPicPr>
+            <a:picLocks noChangeAspect="1"/>
+          </p:cNvPicPr>
+          <p:nvPr/>
+        </p:nvPicPr>
+        <p:blipFill>
+          <a:blip r:embed="rId6"/>
+          <a:stretch>
+            <a:fillRect/>
+          </a:stretch>
+        </p:blipFill>
+        <p:spPr>
+          <a:xfrm>
+            <a:off x="4114523" y="3601299"/>
+            <a:ext cx="2438740" cy="695422"/>
+          </a:xfrm>
+          <a:prstGeom prst="rect">
+            <a:avLst/>
+          </a:prstGeom>
+        </p:spPr>
+      </p:pic>
+      <p:pic>
+        <p:nvPicPr>
+          <p:cNvPr id="20" name="Imagen 19">
+            <a:extLst>
+              <a:ext uri="{FF2B5EF4-FFF2-40B4-BE49-F238E27FC236}">
+                <a16:creationId xmlns:a16="http://schemas.microsoft.com/office/drawing/2014/main" id="{36C2DC17-B1DE-A416-131F-3A866C91D181}"/>
+              </a:ext>
+            </a:extLst>
+          </p:cNvPr>
+          <p:cNvPicPr>
+            <a:picLocks noChangeAspect="1"/>
+          </p:cNvPicPr>
+          <p:nvPr/>
+        </p:nvPicPr>
+        <p:blipFill>
+          <a:blip r:embed="rId7"/>
+          <a:stretch>
+            <a:fillRect/>
+          </a:stretch>
+        </p:blipFill>
+        <p:spPr>
+          <a:xfrm>
+            <a:off x="4114523" y="4449972"/>
+            <a:ext cx="2724530" cy="838317"/>
+          </a:xfrm>
+          <a:prstGeom prst="rect">
+            <a:avLst/>
+          </a:prstGeom>
+        </p:spPr>
+      </p:pic>
+    </p:spTree>
+    <p:extLst>
+      <p:ext uri="{BB962C8B-B14F-4D97-AF65-F5344CB8AC3E}">
+        <p14:creationId xmlns:p14="http://schemas.microsoft.com/office/powerpoint/2010/main" val="3320526323"/>
+      </p:ext>
+    </p:extLst>
+  </p:cSld>
+  <p:clrMapOvr>
+    <a:masterClrMapping/>
+  </p:clrMapOvr>
+</p:sld>
+</file>
+
+<file path=ppt/slides/slide11.xml><?xml version="1.0" encoding="utf-8"?>
+<p:sld xmlns:a="http://schemas.openxmlformats.org/drawingml/2006/main" xmlns:r="http://schemas.openxmlformats.org/officeDocument/2006/relationships" xmlns:p="http://schemas.openxmlformats.org/presentationml/2006/main">
+  <p:cSld>
+    <p:spTree>
+      <p:nvGrpSpPr>
+        <p:cNvPr id="1" name="">
+          <a:extLst>
+            <a:ext uri="{FF2B5EF4-FFF2-40B4-BE49-F238E27FC236}">
+              <a16:creationId xmlns:a16="http://schemas.microsoft.com/office/drawing/2014/main" id="{4D5DE25C-171E-62E7-3E41-BBD48041DD5E}"/>
+            </a:ext>
+          </a:extLst>
+        </p:cNvPr>
+        <p:cNvGrpSpPr/>
+        <p:nvPr/>
+      </p:nvGrpSpPr>
+      <p:grpSpPr>
+        <a:xfrm>
+          <a:off x="0" y="0"/>
+          <a:ext cx="0" cy="0"/>
+          <a:chOff x="0" y="0"/>
+          <a:chExt cx="0" cy="0"/>
+        </a:xfrm>
+      </p:grpSpPr>
+      <p:sp>
+        <p:nvSpPr>
+          <p:cNvPr id="2" name="Título 1">
+            <a:extLst>
+              <a:ext uri="{FF2B5EF4-FFF2-40B4-BE49-F238E27FC236}">
+                <a16:creationId xmlns:a16="http://schemas.microsoft.com/office/drawing/2014/main" id="{791D28F5-78C7-9BF5-0303-1D61ABBC2E79}"/>
+              </a:ext>
+            </a:extLst>
+          </p:cNvPr>
+          <p:cNvSpPr>
+            <a:spLocks noGrp="1"/>
+          </p:cNvSpPr>
+          <p:nvPr>
+            <p:ph type="title"/>
+          </p:nvPr>
+        </p:nvSpPr>
+        <p:spPr/>
+        <p:txBody>
+          <a:bodyPr/>
+          <a:lstStyle/>
+          <a:p>
+            <a:r>
+              <a:rPr lang="es-ES" dirty="0"/>
+              <a:t>Material 3 - Colores</a:t>
+            </a:r>
+          </a:p>
+        </p:txBody>
+      </p:sp>
+      <p:pic>
+        <p:nvPicPr>
+          <p:cNvPr id="4" name="Imagen 3">
+            <a:extLst>
+              <a:ext uri="{FF2B5EF4-FFF2-40B4-BE49-F238E27FC236}">
+                <a16:creationId xmlns:a16="http://schemas.microsoft.com/office/drawing/2014/main" id="{104CCEE9-8DF6-F505-EB94-08128B781BB3}"/>
+              </a:ext>
+            </a:extLst>
+          </p:cNvPr>
+          <p:cNvPicPr>
+            <a:picLocks noChangeAspect="1"/>
+          </p:cNvPicPr>
+          <p:nvPr/>
+        </p:nvPicPr>
+        <p:blipFill>
+          <a:blip r:embed="rId2"/>
+          <a:stretch>
+            <a:fillRect/>
+          </a:stretch>
+        </p:blipFill>
+        <p:spPr>
+          <a:xfrm>
+            <a:off x="923580" y="2138084"/>
+            <a:ext cx="4934639" cy="3991532"/>
+          </a:xfrm>
+          <a:prstGeom prst="rect">
+            <a:avLst/>
+          </a:prstGeom>
+        </p:spPr>
+      </p:pic>
+      <p:pic>
+        <p:nvPicPr>
+          <p:cNvPr id="8" name="Imagen 7">
+            <a:extLst>
+              <a:ext uri="{FF2B5EF4-FFF2-40B4-BE49-F238E27FC236}">
+                <a16:creationId xmlns:a16="http://schemas.microsoft.com/office/drawing/2014/main" id="{7DF82BFA-30DC-754C-D148-8D823331A65A}"/>
+              </a:ext>
+            </a:extLst>
+          </p:cNvPr>
+          <p:cNvPicPr>
+            <a:picLocks noChangeAspect="1"/>
+          </p:cNvPicPr>
+          <p:nvPr/>
+        </p:nvPicPr>
+        <p:blipFill>
+          <a:blip r:embed="rId3"/>
+          <a:stretch>
+            <a:fillRect/>
+          </a:stretch>
+        </p:blipFill>
+        <p:spPr>
+          <a:xfrm>
+            <a:off x="6248915" y="2138084"/>
+            <a:ext cx="4782217" cy="4182059"/>
+          </a:xfrm>
+          <a:prstGeom prst="rect">
+            <a:avLst/>
+          </a:prstGeom>
+        </p:spPr>
+      </p:pic>
+    </p:spTree>
+    <p:extLst>
+      <p:ext uri="{BB962C8B-B14F-4D97-AF65-F5344CB8AC3E}">
+        <p14:creationId xmlns:p14="http://schemas.microsoft.com/office/powerpoint/2010/main" val="2415849042"/>
+      </p:ext>
+    </p:extLst>
+  </p:cSld>
+  <p:clrMapOvr>
+    <a:masterClrMapping/>
+  </p:clrMapOvr>
+</p:sld>
+</file>
+
+<file path=ppt/slides/slide12.xml><?xml version="1.0" encoding="utf-8"?>
+<p:sld xmlns:a="http://schemas.openxmlformats.org/drawingml/2006/main" xmlns:r="http://schemas.openxmlformats.org/officeDocument/2006/relationships" xmlns:p="http://schemas.openxmlformats.org/presentationml/2006/main">
+  <p:cSld>
+    <p:spTree>
+      <p:nvGrpSpPr>
+        <p:cNvPr id="1" name="">
+          <a:extLst>
+            <a:ext uri="{FF2B5EF4-FFF2-40B4-BE49-F238E27FC236}">
+              <a16:creationId xmlns:a16="http://schemas.microsoft.com/office/drawing/2014/main" id="{33C4A87E-1DAE-3F96-67D1-A3A885116E78}"/>
+            </a:ext>
+          </a:extLst>
+        </p:cNvPr>
+        <p:cNvGrpSpPr/>
+        <p:nvPr/>
+      </p:nvGrpSpPr>
+      <p:grpSpPr>
+        <a:xfrm>
+          <a:off x="0" y="0"/>
+          <a:ext cx="0" cy="0"/>
+          <a:chOff x="0" y="0"/>
+          <a:chExt cx="0" cy="0"/>
+        </a:xfrm>
+      </p:grpSpPr>
+      <p:sp>
+        <p:nvSpPr>
+          <p:cNvPr id="2" name="Título 1">
+            <a:extLst>
+              <a:ext uri="{FF2B5EF4-FFF2-40B4-BE49-F238E27FC236}">
+                <a16:creationId xmlns:a16="http://schemas.microsoft.com/office/drawing/2014/main" id="{CB9ACFB0-6940-1D5F-02DC-6D6A37710AE3}"/>
+              </a:ext>
+            </a:extLst>
+          </p:cNvPr>
+          <p:cNvSpPr>
+            <a:spLocks noGrp="1"/>
+          </p:cNvSpPr>
+          <p:nvPr>
+            <p:ph type="title"/>
+          </p:nvPr>
+        </p:nvSpPr>
+        <p:spPr/>
+        <p:txBody>
+          <a:bodyPr/>
+          <a:lstStyle/>
+          <a:p>
+            <a:r>
+              <a:rPr lang="es-ES" dirty="0"/>
+              <a:t>Material 3 - </a:t>
+            </a:r>
+            <a:r>
+              <a:rPr lang="es-ES" dirty="0" err="1"/>
+              <a:t>Overlays</a:t>
+            </a:r>
+            <a:endParaRPr lang="es-ES" dirty="0"/>
+          </a:p>
+        </p:txBody>
+      </p:sp>
+      <p:pic>
+        <p:nvPicPr>
+          <p:cNvPr id="6" name="Imagen 5">
+            <a:extLst>
+              <a:ext uri="{FF2B5EF4-FFF2-40B4-BE49-F238E27FC236}">
+                <a16:creationId xmlns:a16="http://schemas.microsoft.com/office/drawing/2014/main" id="{C9E51B8A-E798-B562-9AAD-23489C1FAA5C}"/>
+              </a:ext>
+            </a:extLst>
+          </p:cNvPr>
+          <p:cNvPicPr>
+            <a:picLocks noChangeAspect="1"/>
+          </p:cNvPicPr>
+          <p:nvPr/>
+        </p:nvPicPr>
+        <p:blipFill>
+          <a:blip r:embed="rId2"/>
+          <a:stretch>
+            <a:fillRect/>
+          </a:stretch>
+        </p:blipFill>
+        <p:spPr>
+          <a:xfrm>
+            <a:off x="838200" y="1523734"/>
+            <a:ext cx="7840169" cy="1905266"/>
+          </a:xfrm>
+          <a:prstGeom prst="rect">
+            <a:avLst/>
+          </a:prstGeom>
+        </p:spPr>
+      </p:pic>
+      <p:pic>
+        <p:nvPicPr>
+          <p:cNvPr id="8" name="Imagen 7">
+            <a:extLst>
+              <a:ext uri="{FF2B5EF4-FFF2-40B4-BE49-F238E27FC236}">
+                <a16:creationId xmlns:a16="http://schemas.microsoft.com/office/drawing/2014/main" id="{0345671D-49C9-A32E-9F9F-47CF9AE31298}"/>
+              </a:ext>
+            </a:extLst>
+          </p:cNvPr>
+          <p:cNvPicPr>
+            <a:picLocks noChangeAspect="1"/>
+          </p:cNvPicPr>
+          <p:nvPr/>
+        </p:nvPicPr>
+        <p:blipFill>
+          <a:blip r:embed="rId3"/>
+          <a:stretch>
+            <a:fillRect/>
+          </a:stretch>
+        </p:blipFill>
+        <p:spPr>
+          <a:xfrm>
+            <a:off x="838200" y="3572476"/>
+            <a:ext cx="7621064" cy="1876687"/>
+          </a:xfrm>
+          <a:prstGeom prst="rect">
+            <a:avLst/>
+          </a:prstGeom>
+        </p:spPr>
+      </p:pic>
+      <p:pic>
+        <p:nvPicPr>
+          <p:cNvPr id="10" name="Imagen 9">
+            <a:extLst>
+              <a:ext uri="{FF2B5EF4-FFF2-40B4-BE49-F238E27FC236}">
+                <a16:creationId xmlns:a16="http://schemas.microsoft.com/office/drawing/2014/main" id="{CB13A85F-8C53-A3FB-AB28-57AF8BDA8D0E}"/>
+              </a:ext>
+            </a:extLst>
+          </p:cNvPr>
+          <p:cNvPicPr>
+            <a:picLocks noChangeAspect="1"/>
+          </p:cNvPicPr>
+          <p:nvPr/>
+        </p:nvPicPr>
+        <p:blipFill>
+          <a:blip r:embed="rId4"/>
+          <a:stretch>
+            <a:fillRect/>
+          </a:stretch>
+        </p:blipFill>
+        <p:spPr>
+          <a:xfrm>
+            <a:off x="838200" y="5616453"/>
+            <a:ext cx="5144218" cy="876422"/>
+          </a:xfrm>
+          <a:prstGeom prst="rect">
+            <a:avLst/>
+          </a:prstGeom>
+        </p:spPr>
+      </p:pic>
+      <p:pic>
+        <p:nvPicPr>
+          <p:cNvPr id="14" name="Imagen 13">
+            <a:extLst>
+              <a:ext uri="{FF2B5EF4-FFF2-40B4-BE49-F238E27FC236}">
+                <a16:creationId xmlns:a16="http://schemas.microsoft.com/office/drawing/2014/main" id="{1AD3CFDB-5FEC-3687-CB00-268BBA6E2B0C}"/>
+              </a:ext>
+            </a:extLst>
+          </p:cNvPr>
+          <p:cNvPicPr>
+            <a:picLocks noChangeAspect="1"/>
+          </p:cNvPicPr>
+          <p:nvPr/>
+        </p:nvPicPr>
+        <p:blipFill>
+          <a:blip r:embed="rId5"/>
+          <a:stretch>
+            <a:fillRect/>
+          </a:stretch>
+        </p:blipFill>
+        <p:spPr>
+          <a:xfrm>
+            <a:off x="6115786" y="5640268"/>
+            <a:ext cx="5125165" cy="828791"/>
+          </a:xfrm>
+          <a:prstGeom prst="rect">
+            <a:avLst/>
+          </a:prstGeom>
+        </p:spPr>
+      </p:pic>
+    </p:spTree>
+    <p:extLst>
+      <p:ext uri="{BB962C8B-B14F-4D97-AF65-F5344CB8AC3E}">
+        <p14:creationId xmlns:p14="http://schemas.microsoft.com/office/powerpoint/2010/main" val="3958430178"/>
+      </p:ext>
+    </p:extLst>
+  </p:cSld>
+  <p:clrMapOvr>
+    <a:masterClrMapping/>
+  </p:clrMapOvr>
+</p:sld>
+</file>
+
+<file path=ppt/slides/slide13.xml><?xml version="1.0" encoding="utf-8"?>
+<p:sld xmlns:a="http://schemas.openxmlformats.org/drawingml/2006/main" xmlns:r="http://schemas.openxmlformats.org/officeDocument/2006/relationships" xmlns:p="http://schemas.openxmlformats.org/presentationml/2006/main">
+  <p:cSld>
+    <p:spTree>
+      <p:nvGrpSpPr>
+        <p:cNvPr id="1" name="">
+          <a:extLst>
+            <a:ext uri="{FF2B5EF4-FFF2-40B4-BE49-F238E27FC236}">
+              <a16:creationId xmlns:a16="http://schemas.microsoft.com/office/drawing/2014/main" id="{82193C30-8EE6-B582-2ED0-F3403C0099BC}"/>
+            </a:ext>
+          </a:extLst>
+        </p:cNvPr>
+        <p:cNvGrpSpPr/>
+        <p:nvPr/>
+      </p:nvGrpSpPr>
+      <p:grpSpPr>
+        <a:xfrm>
+          <a:off x="0" y="0"/>
+          <a:ext cx="0" cy="0"/>
+          <a:chOff x="0" y="0"/>
+          <a:chExt cx="0" cy="0"/>
+        </a:xfrm>
+      </p:grpSpPr>
+      <p:sp>
+        <p:nvSpPr>
+          <p:cNvPr id="2" name="Título 1">
+            <a:extLst>
+              <a:ext uri="{FF2B5EF4-FFF2-40B4-BE49-F238E27FC236}">
+                <a16:creationId xmlns:a16="http://schemas.microsoft.com/office/drawing/2014/main" id="{EEF2FF51-1185-9DFB-EF5F-D1686C45C968}"/>
+              </a:ext>
+            </a:extLst>
+          </p:cNvPr>
+          <p:cNvSpPr>
+            <a:spLocks noGrp="1"/>
+          </p:cNvSpPr>
+          <p:nvPr>
+            <p:ph type="title"/>
+          </p:nvPr>
+        </p:nvSpPr>
+        <p:spPr/>
+        <p:txBody>
+          <a:bodyPr/>
+          <a:lstStyle/>
+          <a:p>
+            <a:r>
+              <a:rPr lang="es-ES" dirty="0"/>
+              <a:t>Material 3 - Temas</a:t>
+            </a:r>
+          </a:p>
+        </p:txBody>
+      </p:sp>
+      <p:pic>
+        <p:nvPicPr>
+          <p:cNvPr id="12" name="Imagen 11">
+            <a:extLst>
+              <a:ext uri="{FF2B5EF4-FFF2-40B4-BE49-F238E27FC236}">
+                <a16:creationId xmlns:a16="http://schemas.microsoft.com/office/drawing/2014/main" id="{9C448246-B22E-8ED2-09A4-5D94B0B27F37}"/>
+              </a:ext>
+            </a:extLst>
+          </p:cNvPr>
+          <p:cNvPicPr>
+            <a:picLocks noChangeAspect="1"/>
+          </p:cNvPicPr>
+          <p:nvPr/>
+        </p:nvPicPr>
+        <p:blipFill>
+          <a:blip r:embed="rId2"/>
+          <a:stretch>
+            <a:fillRect/>
+          </a:stretch>
+        </p:blipFill>
+        <p:spPr>
+          <a:xfrm>
+            <a:off x="838200" y="1871256"/>
+            <a:ext cx="5382376" cy="4829849"/>
+          </a:xfrm>
+          <a:prstGeom prst="rect">
+            <a:avLst/>
+          </a:prstGeom>
+        </p:spPr>
+      </p:pic>
+      <p:pic>
+        <p:nvPicPr>
+          <p:cNvPr id="16" name="Imagen 15">
+            <a:extLst>
+              <a:ext uri="{FF2B5EF4-FFF2-40B4-BE49-F238E27FC236}">
+                <a16:creationId xmlns:a16="http://schemas.microsoft.com/office/drawing/2014/main" id="{95A3B6CF-2A13-8B3B-836B-24064368B002}"/>
+              </a:ext>
+            </a:extLst>
+          </p:cNvPr>
+          <p:cNvPicPr>
+            <a:picLocks noChangeAspect="1"/>
+          </p:cNvPicPr>
+          <p:nvPr/>
+        </p:nvPicPr>
+        <p:blipFill>
+          <a:blip r:embed="rId3"/>
+          <a:stretch>
+            <a:fillRect/>
+          </a:stretch>
+        </p:blipFill>
+        <p:spPr>
+          <a:xfrm>
+            <a:off x="6437214" y="1880782"/>
+            <a:ext cx="5220429" cy="4820323"/>
+          </a:xfrm>
+          <a:prstGeom prst="rect">
+            <a:avLst/>
+          </a:prstGeom>
+        </p:spPr>
+      </p:pic>
+    </p:spTree>
+    <p:extLst>
+      <p:ext uri="{BB962C8B-B14F-4D97-AF65-F5344CB8AC3E}">
+        <p14:creationId xmlns:p14="http://schemas.microsoft.com/office/powerpoint/2010/main" val="1297586039"/>
+      </p:ext>
+    </p:extLst>
+  </p:cSld>
+  <p:clrMapOvr>
+    <a:masterClrMapping/>
+  </p:clrMapOvr>
+</p:sld>
+</file>
+
+<file path=ppt/slides/slide14.xml><?xml version="1.0" encoding="utf-8"?>
+<p:sld xmlns:a="http://schemas.openxmlformats.org/drawingml/2006/main" xmlns:r="http://schemas.openxmlformats.org/officeDocument/2006/relationships" xmlns:p="http://schemas.openxmlformats.org/presentationml/2006/main">
+  <p:cSld>
+    <p:spTree>
+      <p:nvGrpSpPr>
+        <p:cNvPr id="1" name="">
+          <a:extLst>
+            <a:ext uri="{FF2B5EF4-FFF2-40B4-BE49-F238E27FC236}">
+              <a16:creationId xmlns:a16="http://schemas.microsoft.com/office/drawing/2014/main" id="{214E1709-355C-38A9-4ABD-B4861AD8778A}"/>
+            </a:ext>
+          </a:extLst>
+        </p:cNvPr>
+        <p:cNvGrpSpPr/>
+        <p:nvPr/>
+      </p:nvGrpSpPr>
+      <p:grpSpPr>
+        <a:xfrm>
+          <a:off x="0" y="0"/>
+          <a:ext cx="0" cy="0"/>
+          <a:chOff x="0" y="0"/>
+          <a:chExt cx="0" cy="0"/>
+        </a:xfrm>
+      </p:grpSpPr>
+      <p:sp>
+        <p:nvSpPr>
+          <p:cNvPr id="2" name="Título 1">
+            <a:extLst>
+              <a:ext uri="{FF2B5EF4-FFF2-40B4-BE49-F238E27FC236}">
+                <a16:creationId xmlns:a16="http://schemas.microsoft.com/office/drawing/2014/main" id="{6047D79A-61ED-4728-E484-E3B05B398A08}"/>
+              </a:ext>
+            </a:extLst>
+          </p:cNvPr>
+          <p:cNvSpPr>
+            <a:spLocks noGrp="1"/>
+          </p:cNvSpPr>
+          <p:nvPr>
+            <p:ph type="title"/>
+          </p:nvPr>
+        </p:nvSpPr>
+        <p:spPr/>
+        <p:txBody>
+          <a:bodyPr/>
+          <a:lstStyle/>
+          <a:p>
+            <a:r>
+              <a:rPr lang="es-ES" dirty="0"/>
+              <a:t>Clases - </a:t>
+            </a:r>
+            <a:r>
+              <a:rPr lang="es-ES" dirty="0" err="1"/>
+              <a:t>Task</a:t>
+            </a:r>
+            <a:r>
+              <a:rPr lang="es-ES" dirty="0"/>
+              <a:t> &amp; </a:t>
+            </a:r>
+            <a:r>
+              <a:rPr lang="es-ES" dirty="0" err="1"/>
+              <a:t>TaskType</a:t>
+            </a:r>
+            <a:endParaRPr lang="es-ES" dirty="0"/>
+          </a:p>
+        </p:txBody>
+      </p:sp>
+      <p:pic>
+        <p:nvPicPr>
+          <p:cNvPr id="6" name="Imagen 5">
+            <a:extLst>
+              <a:ext uri="{FF2B5EF4-FFF2-40B4-BE49-F238E27FC236}">
+                <a16:creationId xmlns:a16="http://schemas.microsoft.com/office/drawing/2014/main" id="{59038182-CAD9-0582-D42B-DC5D67C20B11}"/>
+              </a:ext>
+            </a:extLst>
+          </p:cNvPr>
+          <p:cNvPicPr>
+            <a:picLocks noChangeAspect="1"/>
+          </p:cNvPicPr>
+          <p:nvPr/>
+        </p:nvPicPr>
+        <p:blipFill>
+          <a:blip r:embed="rId2"/>
+          <a:stretch>
+            <a:fillRect/>
+          </a:stretch>
+        </p:blipFill>
+        <p:spPr>
+          <a:xfrm>
+            <a:off x="3662023" y="1690688"/>
+            <a:ext cx="3724795" cy="4229690"/>
+          </a:xfrm>
+          <a:prstGeom prst="rect">
+            <a:avLst/>
+          </a:prstGeom>
+        </p:spPr>
+      </p:pic>
+      <p:pic>
+        <p:nvPicPr>
+          <p:cNvPr id="8" name="Imagen 7">
+            <a:extLst>
+              <a:ext uri="{FF2B5EF4-FFF2-40B4-BE49-F238E27FC236}">
+                <a16:creationId xmlns:a16="http://schemas.microsoft.com/office/drawing/2014/main" id="{AFE342EB-22B3-2ECD-4B4D-8937B4BD600B}"/>
+              </a:ext>
+            </a:extLst>
+          </p:cNvPr>
+          <p:cNvPicPr>
+            <a:picLocks noChangeAspect="1"/>
+          </p:cNvPicPr>
+          <p:nvPr/>
+        </p:nvPicPr>
+        <p:blipFill>
+          <a:blip r:embed="rId3"/>
+          <a:stretch>
+            <a:fillRect/>
+          </a:stretch>
+        </p:blipFill>
+        <p:spPr>
+          <a:xfrm>
+            <a:off x="7894922" y="1690688"/>
+            <a:ext cx="3677163" cy="3791479"/>
+          </a:xfrm>
+          <a:prstGeom prst="rect">
+            <a:avLst/>
+          </a:prstGeom>
+        </p:spPr>
+      </p:pic>
+      <p:pic>
+        <p:nvPicPr>
+          <p:cNvPr id="10" name="Imagen 9">
+            <a:extLst>
+              <a:ext uri="{FF2B5EF4-FFF2-40B4-BE49-F238E27FC236}">
+                <a16:creationId xmlns:a16="http://schemas.microsoft.com/office/drawing/2014/main" id="{3D8E84B4-40E3-63C4-0C46-5BAE9CC06588}"/>
+              </a:ext>
+            </a:extLst>
+          </p:cNvPr>
+          <p:cNvPicPr>
+            <a:picLocks noChangeAspect="1"/>
+          </p:cNvPicPr>
+          <p:nvPr/>
+        </p:nvPicPr>
+        <p:blipFill>
+          <a:blip r:embed="rId4"/>
+          <a:stretch>
+            <a:fillRect/>
+          </a:stretch>
+        </p:blipFill>
+        <p:spPr>
+          <a:xfrm>
+            <a:off x="619915" y="1690688"/>
+            <a:ext cx="2534004" cy="3229426"/>
+          </a:xfrm>
+          <a:prstGeom prst="rect">
+            <a:avLst/>
+          </a:prstGeom>
+        </p:spPr>
+      </p:pic>
+    </p:spTree>
+    <p:extLst>
+      <p:ext uri="{BB962C8B-B14F-4D97-AF65-F5344CB8AC3E}">
+        <p14:creationId xmlns:p14="http://schemas.microsoft.com/office/powerpoint/2010/main" val="4041176724"/>
+      </p:ext>
+    </p:extLst>
+  </p:cSld>
+  <p:clrMapOvr>
+    <a:masterClrMapping/>
+  </p:clrMapOvr>
+</p:sld>
+</file>
+
+<file path=ppt/slides/slide15.xml><?xml version="1.0" encoding="utf-8"?>
+<p:sld xmlns:a="http://schemas.openxmlformats.org/drawingml/2006/main" xmlns:r="http://schemas.openxmlformats.org/officeDocument/2006/relationships" xmlns:p="http://schemas.openxmlformats.org/presentationml/2006/main">
+  <p:cSld>
+    <p:spTree>
+      <p:nvGrpSpPr>
+        <p:cNvPr id="1" name="">
+          <a:extLst>
+            <a:ext uri="{FF2B5EF4-FFF2-40B4-BE49-F238E27FC236}">
+              <a16:creationId xmlns:a16="http://schemas.microsoft.com/office/drawing/2014/main" id="{F3C90ADA-53F4-0CB9-FF47-6B874C5292A5}"/>
+            </a:ext>
+          </a:extLst>
+        </p:cNvPr>
+        <p:cNvGrpSpPr/>
+        <p:nvPr/>
+      </p:nvGrpSpPr>
+      <p:grpSpPr>
+        <a:xfrm>
+          <a:off x="0" y="0"/>
+          <a:ext cx="0" cy="0"/>
+          <a:chOff x="0" y="0"/>
+          <a:chExt cx="0" cy="0"/>
+        </a:xfrm>
+      </p:grpSpPr>
+      <p:sp>
+        <p:nvSpPr>
+          <p:cNvPr id="2" name="Título 1">
+            <a:extLst>
+              <a:ext uri="{FF2B5EF4-FFF2-40B4-BE49-F238E27FC236}">
+                <a16:creationId xmlns:a16="http://schemas.microsoft.com/office/drawing/2014/main" id="{1F96C172-A9E2-2038-87E0-56C0937EE9D5}"/>
+              </a:ext>
+            </a:extLst>
+          </p:cNvPr>
+          <p:cNvSpPr>
+            <a:spLocks noGrp="1"/>
+          </p:cNvSpPr>
+          <p:nvPr>
+            <p:ph type="title"/>
+          </p:nvPr>
+        </p:nvSpPr>
+        <p:spPr/>
+        <p:txBody>
+          <a:bodyPr/>
+          <a:lstStyle/>
+          <a:p>
+            <a:r>
+              <a:rPr lang="es-ES" dirty="0"/>
+              <a:t>Clases – </a:t>
+            </a:r>
+            <a:r>
+              <a:rPr lang="es-ES" dirty="0" err="1"/>
+              <a:t>Team</a:t>
+            </a:r>
+            <a:r>
+              <a:rPr lang="es-ES" dirty="0"/>
+              <a:t> &amp; </a:t>
+            </a:r>
+            <a:r>
+              <a:rPr lang="es-ES" dirty="0" err="1"/>
+              <a:t>User</a:t>
+            </a:r>
+            <a:r>
+              <a:rPr lang="es-ES" dirty="0"/>
+              <a:t> </a:t>
+            </a:r>
+          </a:p>
+        </p:txBody>
+      </p:sp>
+      <p:pic>
+        <p:nvPicPr>
+          <p:cNvPr id="4" name="Imagen 3">
+            <a:extLst>
+              <a:ext uri="{FF2B5EF4-FFF2-40B4-BE49-F238E27FC236}">
+                <a16:creationId xmlns:a16="http://schemas.microsoft.com/office/drawing/2014/main" id="{EC5C5889-C459-A942-44F5-FBCC71760B26}"/>
+              </a:ext>
+            </a:extLst>
+          </p:cNvPr>
+          <p:cNvPicPr>
+            <a:picLocks noChangeAspect="1"/>
+          </p:cNvPicPr>
+          <p:nvPr/>
+        </p:nvPicPr>
+        <p:blipFill>
+          <a:blip r:embed="rId2"/>
+          <a:stretch>
+            <a:fillRect/>
+          </a:stretch>
+        </p:blipFill>
+        <p:spPr>
+          <a:xfrm>
+            <a:off x="1545797" y="1669372"/>
+            <a:ext cx="4763165" cy="4429743"/>
+          </a:xfrm>
+          <a:prstGeom prst="rect">
+            <a:avLst/>
+          </a:prstGeom>
+        </p:spPr>
+      </p:pic>
+      <p:pic>
+        <p:nvPicPr>
+          <p:cNvPr id="6" name="Imagen 5">
+            <a:extLst>
+              <a:ext uri="{FF2B5EF4-FFF2-40B4-BE49-F238E27FC236}">
+                <a16:creationId xmlns:a16="http://schemas.microsoft.com/office/drawing/2014/main" id="{513E9563-2CD8-0C7D-FF36-AD0C8E286AD2}"/>
+              </a:ext>
+            </a:extLst>
+          </p:cNvPr>
+          <p:cNvPicPr>
+            <a:picLocks noChangeAspect="1"/>
+          </p:cNvPicPr>
+          <p:nvPr/>
+        </p:nvPicPr>
+        <p:blipFill>
+          <a:blip r:embed="rId3"/>
+          <a:stretch>
+            <a:fillRect/>
+          </a:stretch>
+        </p:blipFill>
+        <p:spPr>
+          <a:xfrm>
+            <a:off x="7016559" y="1669372"/>
+            <a:ext cx="3753374" cy="4448796"/>
+          </a:xfrm>
+          <a:prstGeom prst="rect">
+            <a:avLst/>
+          </a:prstGeom>
+        </p:spPr>
+      </p:pic>
+    </p:spTree>
+    <p:extLst>
+      <p:ext uri="{BB962C8B-B14F-4D97-AF65-F5344CB8AC3E}">
+        <p14:creationId xmlns:p14="http://schemas.microsoft.com/office/powerpoint/2010/main" val="197351114"/>
+      </p:ext>
+    </p:extLst>
+  </p:cSld>
+  <p:clrMapOvr>
+    <a:masterClrMapping/>
+  </p:clrMapOvr>
+</p:sld>
+</file>
+
+<file path=ppt/slides/slide16.xml><?xml version="1.0" encoding="utf-8"?>
+<p:sld xmlns:a="http://schemas.openxmlformats.org/drawingml/2006/main" xmlns:r="http://schemas.openxmlformats.org/officeDocument/2006/relationships" xmlns:p="http://schemas.openxmlformats.org/presentationml/2006/main">
+  <p:cSld>
+    <p:spTree>
+      <p:nvGrpSpPr>
+        <p:cNvPr id="1" name="">
+          <a:extLst>
+            <a:ext uri="{FF2B5EF4-FFF2-40B4-BE49-F238E27FC236}">
+              <a16:creationId xmlns:a16="http://schemas.microsoft.com/office/drawing/2014/main" id="{CE2A64E4-51A5-C34A-0EDA-296B8DE85561}"/>
+            </a:ext>
+          </a:extLst>
+        </p:cNvPr>
+        <p:cNvGrpSpPr/>
+        <p:nvPr/>
+      </p:nvGrpSpPr>
+      <p:grpSpPr>
+        <a:xfrm>
+          <a:off x="0" y="0"/>
+          <a:ext cx="0" cy="0"/>
+          <a:chOff x="0" y="0"/>
+          <a:chExt cx="0" cy="0"/>
+        </a:xfrm>
+      </p:grpSpPr>
+      <p:sp>
+        <p:nvSpPr>
+          <p:cNvPr id="2" name="Título 1">
+            <a:extLst>
+              <a:ext uri="{FF2B5EF4-FFF2-40B4-BE49-F238E27FC236}">
+                <a16:creationId xmlns:a16="http://schemas.microsoft.com/office/drawing/2014/main" id="{0D7414A0-0A94-EC03-0FF4-D7585AB971C2}"/>
+              </a:ext>
+            </a:extLst>
+          </p:cNvPr>
+          <p:cNvSpPr>
+            <a:spLocks noGrp="1"/>
+          </p:cNvSpPr>
+          <p:nvPr>
+            <p:ph type="title"/>
+          </p:nvPr>
+        </p:nvSpPr>
+        <p:spPr/>
+        <p:txBody>
+          <a:bodyPr/>
+          <a:lstStyle/>
+          <a:p>
+            <a:r>
+              <a:rPr lang="es-ES" dirty="0"/>
+              <a:t>Clases – Definición en la DB</a:t>
+            </a:r>
+          </a:p>
+        </p:txBody>
+      </p:sp>
+      <p:pic>
+        <p:nvPicPr>
+          <p:cNvPr id="4" name="Imagen 3">
+            <a:extLst>
+              <a:ext uri="{FF2B5EF4-FFF2-40B4-BE49-F238E27FC236}">
+                <a16:creationId xmlns:a16="http://schemas.microsoft.com/office/drawing/2014/main" id="{F156182C-A982-2598-C79F-2FD92690E772}"/>
+              </a:ext>
+            </a:extLst>
+          </p:cNvPr>
+          <p:cNvPicPr>
+            <a:picLocks noChangeAspect="1"/>
+          </p:cNvPicPr>
+          <p:nvPr/>
+        </p:nvPicPr>
+        <p:blipFill>
+          <a:blip r:embed="rId2"/>
+          <a:stretch>
+            <a:fillRect/>
+          </a:stretch>
+        </p:blipFill>
+        <p:spPr>
+          <a:xfrm>
+            <a:off x="142056" y="1874473"/>
+            <a:ext cx="6230219" cy="3648584"/>
+          </a:xfrm>
+          <a:prstGeom prst="rect">
+            <a:avLst/>
+          </a:prstGeom>
+        </p:spPr>
+      </p:pic>
+      <p:pic>
+        <p:nvPicPr>
+          <p:cNvPr id="6" name="Imagen 5">
+            <a:extLst>
+              <a:ext uri="{FF2B5EF4-FFF2-40B4-BE49-F238E27FC236}">
+                <a16:creationId xmlns:a16="http://schemas.microsoft.com/office/drawing/2014/main" id="{982ACD07-C082-A10C-9801-3977994AE12F}"/>
+              </a:ext>
+            </a:extLst>
+          </p:cNvPr>
+          <p:cNvPicPr>
+            <a:picLocks noChangeAspect="1"/>
+          </p:cNvPicPr>
+          <p:nvPr/>
+        </p:nvPicPr>
+        <p:blipFill>
+          <a:blip r:embed="rId3"/>
+          <a:stretch>
+            <a:fillRect/>
+          </a:stretch>
+        </p:blipFill>
+        <p:spPr>
+          <a:xfrm>
+            <a:off x="6515147" y="1874473"/>
+            <a:ext cx="5534797" cy="4029637"/>
+          </a:xfrm>
+          <a:prstGeom prst="rect">
+            <a:avLst/>
+          </a:prstGeom>
+        </p:spPr>
+      </p:pic>
+    </p:spTree>
+    <p:extLst>
+      <p:ext uri="{BB962C8B-B14F-4D97-AF65-F5344CB8AC3E}">
+        <p14:creationId xmlns:p14="http://schemas.microsoft.com/office/powerpoint/2010/main" val="620780621"/>
+      </p:ext>
+    </p:extLst>
+  </p:cSld>
+  <p:clrMapOvr>
+    <a:masterClrMapping/>
+  </p:clrMapOvr>
+</p:sld>
+</file>
+
+<file path=ppt/slides/slide17.xml><?xml version="1.0" encoding="utf-8"?>
+<p:sld xmlns:a="http://schemas.openxmlformats.org/drawingml/2006/main" xmlns:r="http://schemas.openxmlformats.org/officeDocument/2006/relationships" xmlns:p="http://schemas.openxmlformats.org/presentationml/2006/main">
+  <p:cSld>
+    <p:spTree>
+      <p:nvGrpSpPr>
+        <p:cNvPr id="1" name="">
+          <a:extLst>
+            <a:ext uri="{FF2B5EF4-FFF2-40B4-BE49-F238E27FC236}">
+              <a16:creationId xmlns:a16="http://schemas.microsoft.com/office/drawing/2014/main" id="{6CA4AAB1-8A46-B293-DA5B-CDEC27B902B9}"/>
+            </a:ext>
+          </a:extLst>
+        </p:cNvPr>
+        <p:cNvGrpSpPr/>
+        <p:nvPr/>
+      </p:nvGrpSpPr>
+      <p:grpSpPr>
+        <a:xfrm>
+          <a:off x="0" y="0"/>
+          <a:ext cx="0" cy="0"/>
+          <a:chOff x="0" y="0"/>
+          <a:chExt cx="0" cy="0"/>
+        </a:xfrm>
+      </p:grpSpPr>
+      <p:sp>
+        <p:nvSpPr>
+          <p:cNvPr id="2" name="Título 1">
+            <a:extLst>
+              <a:ext uri="{FF2B5EF4-FFF2-40B4-BE49-F238E27FC236}">
+                <a16:creationId xmlns:a16="http://schemas.microsoft.com/office/drawing/2014/main" id="{3AE62472-A161-8CFD-75EF-CD233C4D36E6}"/>
+              </a:ext>
+            </a:extLst>
+          </p:cNvPr>
+          <p:cNvSpPr>
+            <a:spLocks noGrp="1"/>
+          </p:cNvSpPr>
+          <p:nvPr>
+            <p:ph type="title"/>
+          </p:nvPr>
+        </p:nvSpPr>
+        <p:spPr/>
+        <p:txBody>
+          <a:bodyPr/>
+          <a:lstStyle/>
+          <a:p>
+            <a:r>
+              <a:rPr lang="es-ES" dirty="0"/>
+              <a:t>SP </a:t>
+            </a:r>
+            <a:r>
+              <a:rPr lang="es-ES" dirty="0" err="1"/>
+              <a:t>Helper</a:t>
+            </a:r>
+            <a:r>
+              <a:rPr lang="es-ES" dirty="0"/>
+              <a:t> - Modo nocturno</a:t>
+            </a:r>
+          </a:p>
+        </p:txBody>
+      </p:sp>
+      <p:pic>
+        <p:nvPicPr>
+          <p:cNvPr id="6" name="Imagen 5">
+            <a:extLst>
+              <a:ext uri="{FF2B5EF4-FFF2-40B4-BE49-F238E27FC236}">
+                <a16:creationId xmlns:a16="http://schemas.microsoft.com/office/drawing/2014/main" id="{5E094B79-2946-F7AD-F03F-EAD285105FE4}"/>
+              </a:ext>
+            </a:extLst>
+          </p:cNvPr>
+          <p:cNvPicPr>
+            <a:picLocks noChangeAspect="1"/>
+          </p:cNvPicPr>
+          <p:nvPr/>
+        </p:nvPicPr>
+        <p:blipFill>
+          <a:blip r:embed="rId2"/>
+          <a:stretch>
+            <a:fillRect/>
+          </a:stretch>
+        </p:blipFill>
+        <p:spPr>
+          <a:xfrm>
+            <a:off x="358222" y="1588733"/>
+            <a:ext cx="6115904" cy="4839375"/>
+          </a:xfrm>
+          <a:prstGeom prst="rect">
+            <a:avLst/>
+          </a:prstGeom>
+        </p:spPr>
+      </p:pic>
+      <p:pic>
+        <p:nvPicPr>
+          <p:cNvPr id="10" name="Imagen 9">
+            <a:extLst>
+              <a:ext uri="{FF2B5EF4-FFF2-40B4-BE49-F238E27FC236}">
+                <a16:creationId xmlns:a16="http://schemas.microsoft.com/office/drawing/2014/main" id="{540A978D-409E-8EE3-4D5F-8852EF403B37}"/>
+              </a:ext>
+            </a:extLst>
+          </p:cNvPr>
+          <p:cNvPicPr>
+            <a:picLocks noChangeAspect="1"/>
+          </p:cNvPicPr>
+          <p:nvPr/>
+        </p:nvPicPr>
+        <p:blipFill>
+          <a:blip r:embed="rId3"/>
+          <a:stretch>
+            <a:fillRect/>
+          </a:stretch>
+        </p:blipFill>
+        <p:spPr>
+          <a:xfrm>
+            <a:off x="6844552" y="1364863"/>
+            <a:ext cx="4858428" cy="5287113"/>
+          </a:xfrm>
+          <a:prstGeom prst="rect">
+            <a:avLst/>
+          </a:prstGeom>
+        </p:spPr>
+      </p:pic>
+    </p:spTree>
+    <p:extLst>
+      <p:ext uri="{BB962C8B-B14F-4D97-AF65-F5344CB8AC3E}">
+        <p14:creationId xmlns:p14="http://schemas.microsoft.com/office/powerpoint/2010/main" val="3708788903"/>
+      </p:ext>
+    </p:extLst>
+  </p:cSld>
+  <p:clrMapOvr>
+    <a:masterClrMapping/>
+  </p:clrMapOvr>
+</p:sld>
+</file>
+
+<file path=ppt/slides/slide18.xml><?xml version="1.0" encoding="utf-8"?>
+<p:sld xmlns:a="http://schemas.openxmlformats.org/drawingml/2006/main" xmlns:r="http://schemas.openxmlformats.org/officeDocument/2006/relationships" xmlns:p="http://schemas.openxmlformats.org/presentationml/2006/main">
+  <p:cSld>
+    <p:spTree>
+      <p:nvGrpSpPr>
+        <p:cNvPr id="1" name="">
+          <a:extLst>
+            <a:ext uri="{FF2B5EF4-FFF2-40B4-BE49-F238E27FC236}">
+              <a16:creationId xmlns:a16="http://schemas.microsoft.com/office/drawing/2014/main" id="{681F7696-E1A0-C49E-1923-95BB03927817}"/>
+            </a:ext>
+          </a:extLst>
+        </p:cNvPr>
+        <p:cNvGrpSpPr/>
+        <p:nvPr/>
+      </p:nvGrpSpPr>
+      <p:grpSpPr>
+        <a:xfrm>
+          <a:off x="0" y="0"/>
+          <a:ext cx="0" cy="0"/>
+          <a:chOff x="0" y="0"/>
+          <a:chExt cx="0" cy="0"/>
+        </a:xfrm>
+      </p:grpSpPr>
+      <p:sp>
+        <p:nvSpPr>
+          <p:cNvPr id="2" name="Título 1">
+            <a:extLst>
+              <a:ext uri="{FF2B5EF4-FFF2-40B4-BE49-F238E27FC236}">
+                <a16:creationId xmlns:a16="http://schemas.microsoft.com/office/drawing/2014/main" id="{608CE8A0-EC9C-E91E-0523-84CFF0164BAA}"/>
+              </a:ext>
+            </a:extLst>
+          </p:cNvPr>
+          <p:cNvSpPr>
+            <a:spLocks noGrp="1"/>
+          </p:cNvSpPr>
+          <p:nvPr>
+            <p:ph type="title"/>
+          </p:nvPr>
+        </p:nvSpPr>
+        <p:spPr/>
+        <p:txBody>
+          <a:bodyPr/>
+          <a:lstStyle/>
+          <a:p>
+            <a:r>
+              <a:rPr lang="es-ES" dirty="0"/>
+              <a:t>SP </a:t>
+            </a:r>
+            <a:r>
+              <a:rPr lang="es-ES" dirty="0" err="1"/>
+              <a:t>Helper</a:t>
+            </a:r>
+            <a:r>
+              <a:rPr lang="es-ES" dirty="0"/>
+              <a:t> – ID del Usuario</a:t>
+            </a:r>
+          </a:p>
+        </p:txBody>
+      </p:sp>
+      <p:pic>
+        <p:nvPicPr>
+          <p:cNvPr id="4" name="Imagen 3">
+            <a:extLst>
+              <a:ext uri="{FF2B5EF4-FFF2-40B4-BE49-F238E27FC236}">
+                <a16:creationId xmlns:a16="http://schemas.microsoft.com/office/drawing/2014/main" id="{B355A4E9-1726-FDFB-C7EF-2F3EAA3D7CBA}"/>
+              </a:ext>
+            </a:extLst>
+          </p:cNvPr>
+          <p:cNvPicPr>
+            <a:picLocks noChangeAspect="1"/>
+          </p:cNvPicPr>
+          <p:nvPr/>
+        </p:nvPicPr>
+        <p:blipFill>
+          <a:blip r:embed="rId2"/>
+          <a:stretch>
+            <a:fillRect/>
+          </a:stretch>
+        </p:blipFill>
+        <p:spPr>
+          <a:xfrm>
+            <a:off x="838200" y="1690688"/>
+            <a:ext cx="5125165" cy="3353268"/>
+          </a:xfrm>
+          <a:prstGeom prst="rect">
+            <a:avLst/>
+          </a:prstGeom>
+        </p:spPr>
+      </p:pic>
+    </p:spTree>
+    <p:extLst>
+      <p:ext uri="{BB962C8B-B14F-4D97-AF65-F5344CB8AC3E}">
+        <p14:creationId xmlns:p14="http://schemas.microsoft.com/office/powerpoint/2010/main" val="2054437212"/>
+      </p:ext>
+    </p:extLst>
+  </p:cSld>
+  <p:clrMapOvr>
+    <a:masterClrMapping/>
+  </p:clrMapOvr>
+</p:sld>
+</file>
+
+<file path=ppt/slides/slide19.xml><?xml version="1.0" encoding="utf-8"?>
+<p:sld xmlns:a="http://schemas.openxmlformats.org/drawingml/2006/main" xmlns:r="http://schemas.openxmlformats.org/officeDocument/2006/relationships" xmlns:p="http://schemas.openxmlformats.org/presentationml/2006/main">
+  <p:cSld>
+    <p:spTree>
+      <p:nvGrpSpPr>
+        <p:cNvPr id="1" name="">
+          <a:extLst>
+            <a:ext uri="{FF2B5EF4-FFF2-40B4-BE49-F238E27FC236}">
+              <a16:creationId xmlns:a16="http://schemas.microsoft.com/office/drawing/2014/main" id="{942D2799-2930-EE06-39E0-F0138E35E1FF}"/>
+            </a:ext>
+          </a:extLst>
+        </p:cNvPr>
+        <p:cNvGrpSpPr/>
+        <p:nvPr/>
+      </p:nvGrpSpPr>
+      <p:grpSpPr>
+        <a:xfrm>
+          <a:off x="0" y="0"/>
+          <a:ext cx="0" cy="0"/>
+          <a:chOff x="0" y="0"/>
+          <a:chExt cx="0" cy="0"/>
+        </a:xfrm>
+      </p:grpSpPr>
+      <p:sp>
+        <p:nvSpPr>
+          <p:cNvPr id="2" name="Título 1">
+            <a:extLst>
+              <a:ext uri="{FF2B5EF4-FFF2-40B4-BE49-F238E27FC236}">
+                <a16:creationId xmlns:a16="http://schemas.microsoft.com/office/drawing/2014/main" id="{509D26C8-CBAE-F80B-D880-288C807AC6AE}"/>
+              </a:ext>
+            </a:extLst>
+          </p:cNvPr>
+          <p:cNvSpPr>
+            <a:spLocks noGrp="1"/>
+          </p:cNvSpPr>
+          <p:nvPr>
+            <p:ph type="title"/>
+          </p:nvPr>
+        </p:nvSpPr>
+        <p:spPr/>
+        <p:txBody>
+          <a:bodyPr/>
+          <a:lstStyle/>
+          <a:p>
+            <a:r>
+              <a:rPr lang="es-ES" dirty="0"/>
+              <a:t>[Ej. Código]</a:t>
+            </a:r>
+          </a:p>
+        </p:txBody>
+      </p:sp>
+    </p:spTree>
+    <p:extLst>
+      <p:ext uri="{BB962C8B-B14F-4D97-AF65-F5344CB8AC3E}">
+        <p14:creationId xmlns:p14="http://schemas.microsoft.com/office/powerpoint/2010/main" val="1876061896"/>
+      </p:ext>
+    </p:extLst>
+  </p:cSld>
+  <p:clrMapOvr>
+    <a:masterClrMapping/>
+  </p:clrMapOvr>
+</p:sld>
+</file>
+
 <file path=ppt/slides/slide2.xml><?xml version="1.0" encoding="utf-8"?>
 <p:sld xmlns:a="http://schemas.openxmlformats.org/drawingml/2006/main" xmlns:r="http://schemas.openxmlformats.org/officeDocument/2006/relationships" xmlns:p="http://schemas.openxmlformats.org/presentationml/2006/main">
   <p:cSld>
@@ -3233,6 +4667,196 @@
       <p:bldP spid="3" grpId="0" uiExpand="1" build="p"/>
     </p:bldLst>
   </p:timing>
+</p:sld>
+</file>
+
+<file path=ppt/slides/slide20.xml><?xml version="1.0" encoding="utf-8"?>
+<p:sld xmlns:a="http://schemas.openxmlformats.org/drawingml/2006/main" xmlns:r="http://schemas.openxmlformats.org/officeDocument/2006/relationships" xmlns:p="http://schemas.openxmlformats.org/presentationml/2006/main">
+  <p:cSld>
+    <p:spTree>
+      <p:nvGrpSpPr>
+        <p:cNvPr id="1" name="">
+          <a:extLst>
+            <a:ext uri="{FF2B5EF4-FFF2-40B4-BE49-F238E27FC236}">
+              <a16:creationId xmlns:a16="http://schemas.microsoft.com/office/drawing/2014/main" id="{CC960753-D393-F19F-F223-5901185830E8}"/>
+            </a:ext>
+          </a:extLst>
+        </p:cNvPr>
+        <p:cNvGrpSpPr/>
+        <p:nvPr/>
+      </p:nvGrpSpPr>
+      <p:grpSpPr>
+        <a:xfrm>
+          <a:off x="0" y="0"/>
+          <a:ext cx="0" cy="0"/>
+          <a:chOff x="0" y="0"/>
+          <a:chExt cx="0" cy="0"/>
+        </a:xfrm>
+      </p:grpSpPr>
+      <p:sp>
+        <p:nvSpPr>
+          <p:cNvPr id="2" name="Título 1">
+            <a:extLst>
+              <a:ext uri="{FF2B5EF4-FFF2-40B4-BE49-F238E27FC236}">
+                <a16:creationId xmlns:a16="http://schemas.microsoft.com/office/drawing/2014/main" id="{AC5008E2-DB3A-5892-BDF8-8531F7D8E772}"/>
+              </a:ext>
+            </a:extLst>
+          </p:cNvPr>
+          <p:cNvSpPr>
+            <a:spLocks noGrp="1"/>
+          </p:cNvSpPr>
+          <p:nvPr>
+            <p:ph type="title"/>
+          </p:nvPr>
+        </p:nvSpPr>
+        <p:spPr/>
+        <p:txBody>
+          <a:bodyPr/>
+          <a:lstStyle/>
+          <a:p>
+            <a:r>
+              <a:rPr lang="es-ES" dirty="0"/>
+              <a:t>[Ej. Código]</a:t>
+            </a:r>
+          </a:p>
+        </p:txBody>
+      </p:sp>
+    </p:spTree>
+    <p:extLst>
+      <p:ext uri="{BB962C8B-B14F-4D97-AF65-F5344CB8AC3E}">
+        <p14:creationId xmlns:p14="http://schemas.microsoft.com/office/powerpoint/2010/main" val="1404060965"/>
+      </p:ext>
+    </p:extLst>
+  </p:cSld>
+  <p:clrMapOvr>
+    <a:masterClrMapping/>
+  </p:clrMapOvr>
+</p:sld>
+</file>
+
+<file path=ppt/slides/slide21.xml><?xml version="1.0" encoding="utf-8"?>
+<p:sld xmlns:a="http://schemas.openxmlformats.org/drawingml/2006/main" xmlns:r="http://schemas.openxmlformats.org/officeDocument/2006/relationships" xmlns:p="http://schemas.openxmlformats.org/presentationml/2006/main">
+  <p:cSld>
+    <p:spTree>
+      <p:nvGrpSpPr>
+        <p:cNvPr id="1" name=""/>
+        <p:cNvGrpSpPr/>
+        <p:nvPr/>
+      </p:nvGrpSpPr>
+      <p:grpSpPr>
+        <a:xfrm>
+          <a:off x="0" y="0"/>
+          <a:ext cx="0" cy="0"/>
+          <a:chOff x="0" y="0"/>
+          <a:chExt cx="0" cy="0"/>
+        </a:xfrm>
+      </p:grpSpPr>
+      <p:sp>
+        <p:nvSpPr>
+          <p:cNvPr id="2" name="Título 1">
+            <a:extLst>
+              <a:ext uri="{FF2B5EF4-FFF2-40B4-BE49-F238E27FC236}">
+                <a16:creationId xmlns:a16="http://schemas.microsoft.com/office/drawing/2014/main" id="{724BEB4F-D29F-07A1-2518-4855F0CF39D0}"/>
+              </a:ext>
+            </a:extLst>
+          </p:cNvPr>
+          <p:cNvSpPr>
+            <a:spLocks noGrp="1"/>
+          </p:cNvSpPr>
+          <p:nvPr>
+            <p:ph type="title"/>
+          </p:nvPr>
+        </p:nvSpPr>
+        <p:spPr/>
+        <p:txBody>
+          <a:bodyPr/>
+          <a:lstStyle/>
+          <a:p>
+            <a:r>
+              <a:rPr lang="es-ES" dirty="0"/>
+              <a:t>Añadir a Futuro</a:t>
+            </a:r>
+          </a:p>
+        </p:txBody>
+      </p:sp>
+      <p:sp>
+        <p:nvSpPr>
+          <p:cNvPr id="3" name="Marcador de contenido 2">
+            <a:extLst>
+              <a:ext uri="{FF2B5EF4-FFF2-40B4-BE49-F238E27FC236}">
+                <a16:creationId xmlns:a16="http://schemas.microsoft.com/office/drawing/2014/main" id="{03FC43B1-2BC0-C176-1BD7-4589A8CD8826}"/>
+              </a:ext>
+            </a:extLst>
+          </p:cNvPr>
+          <p:cNvSpPr>
+            <a:spLocks noGrp="1"/>
+          </p:cNvSpPr>
+          <p:nvPr>
+            <p:ph idx="1"/>
+          </p:nvPr>
+        </p:nvSpPr>
+        <p:spPr/>
+        <p:txBody>
+          <a:bodyPr/>
+          <a:lstStyle/>
+          <a:p>
+            <a:r>
+              <a:rPr lang="es-ES" dirty="0" err="1"/>
+              <a:t>Activities</a:t>
+            </a:r>
+            <a:r>
+              <a:rPr lang="es-ES" dirty="0"/>
+              <a:t> &gt;&gt; </a:t>
+            </a:r>
+            <a:r>
+              <a:rPr lang="es-ES" dirty="0" err="1"/>
+              <a:t>Fragments</a:t>
+            </a:r>
+            <a:endParaRPr lang="es-ES" dirty="0"/>
+          </a:p>
+          <a:p>
+            <a:r>
+              <a:rPr lang="es-ES" dirty="0"/>
+              <a:t>Añadir temas (</a:t>
+            </a:r>
+            <a:r>
+              <a:rPr lang="es-ES" dirty="0" err="1"/>
+              <a:t>Settings</a:t>
+            </a:r>
+            <a:r>
+              <a:rPr lang="es-ES" dirty="0"/>
+              <a:t>)</a:t>
+            </a:r>
+          </a:p>
+          <a:p>
+            <a:r>
+              <a:rPr lang="es-ES" dirty="0"/>
+              <a:t>Usar listas dinámicas + </a:t>
+            </a:r>
+            <a:r>
+              <a:rPr lang="es-ES" dirty="0" err="1"/>
+              <a:t>Fragments</a:t>
+            </a:r>
+            <a:endParaRPr lang="es-ES" dirty="0"/>
+          </a:p>
+          <a:p>
+            <a:r>
+              <a:rPr lang="es-ES" dirty="0"/>
+              <a:t> </a:t>
+            </a:r>
+          </a:p>
+        </p:txBody>
+      </p:sp>
+    </p:spTree>
+    <p:extLst>
+      <p:ext uri="{BB962C8B-B14F-4D97-AF65-F5344CB8AC3E}">
+        <p14:creationId xmlns:p14="http://schemas.microsoft.com/office/powerpoint/2010/main" val="3783462933"/>
+      </p:ext>
+    </p:extLst>
+  </p:cSld>
+  <p:clrMapOvr>
+    <a:masterClrMapping/>
+  </p:clrMapOvr>
 </p:sld>
 </file>
 
@@ -4489,40 +6113,47 @@
           <a:lstStyle/>
           <a:p>
             <a:r>
-              <a:rPr lang="es-ES" dirty="0"/>
-              <a:t>Estructura</a:t>
-            </a:r>
-          </a:p>
-        </p:txBody>
-      </p:sp>
-      <p:sp>
-        <p:nvSpPr>
-          <p:cNvPr id="3" name="Marcador de contenido 2">
+              <a:rPr lang="es-ES" sz="4000" dirty="0"/>
+              <a:t>ESTRUCTURA</a:t>
+            </a:r>
+          </a:p>
+        </p:txBody>
+      </p:sp>
+      <p:pic>
+        <p:nvPicPr>
+          <p:cNvPr id="6" name="Marcador de contenido 5">
             <a:extLst>
               <a:ext uri="{FF2B5EF4-FFF2-40B4-BE49-F238E27FC236}">
-                <a16:creationId xmlns:a16="http://schemas.microsoft.com/office/drawing/2014/main" id="{7AA29690-3DF7-C11B-A632-EA31F9704EAC}"/>
+                <a16:creationId xmlns:a16="http://schemas.microsoft.com/office/drawing/2014/main" id="{89FE70AE-0629-CE8D-8EC7-9CDF1A91930E}"/>
               </a:ext>
             </a:extLst>
           </p:cNvPr>
-          <p:cNvSpPr>
-            <a:spLocks noGrp="1"/>
-          </p:cNvSpPr>
+          <p:cNvPicPr>
+            <a:picLocks noGrp="1" noChangeAspect="1"/>
+          </p:cNvPicPr>
           <p:nvPr>
             <p:ph idx="1"/>
           </p:nvPr>
-        </p:nvSpPr>
-        <p:spPr/>
-        <p:txBody>
-          <a:bodyPr/>
-          <a:lstStyle/>
-          <a:p>
-            <a:r>
-              <a:rPr lang="es-ES" dirty="0"/>
-              <a:t>[Imagen Boceto]</a:t>
-            </a:r>
-          </a:p>
-        </p:txBody>
-      </p:sp>
+        </p:nvPicPr>
+        <p:blipFill>
+          <a:blip r:embed="rId2">
+            <a:extLst>
+              <a:ext uri="{28A0092B-C50C-407E-A947-70E740481C1C}">
+                <a14:useLocalDpi xmlns:a14="http://schemas.microsoft.com/office/drawing/2010/main" val="0"/>
+              </a:ext>
+            </a:extLst>
+          </a:blip>
+          <a:stretch>
+            <a:fillRect/>
+          </a:stretch>
+        </p:blipFill>
+        <p:spPr>
+          <a:xfrm>
+            <a:off x="6412165" y="457200"/>
+            <a:ext cx="3714245" cy="5980113"/>
+          </a:xfrm>
+        </p:spPr>
+      </p:pic>
       <p:sp>
         <p:nvSpPr>
           <p:cNvPr id="4" name="Marcador de texto 3">
@@ -4541,7 +6172,9 @@
         </p:nvSpPr>
         <p:spPr/>
         <p:txBody>
-          <a:bodyPr/>
+          <a:bodyPr>
+            <a:normAutofit/>
+          </a:bodyPr>
           <a:lstStyle/>
           <a:p>
             <a:pPr marL="285750" indent="-285750">
@@ -4549,7 +6182,7 @@
               <a:buChar char="•"/>
             </a:pPr>
             <a:r>
-              <a:rPr lang="es-ES" dirty="0"/>
+              <a:rPr lang="es-ES" sz="2400" dirty="0"/>
               <a:t>Home</a:t>
             </a:r>
           </a:p>
@@ -4559,10 +6192,10 @@
               <a:buChar char="•"/>
             </a:pPr>
             <a:r>
-              <a:rPr lang="es-ES" dirty="0" err="1"/>
+              <a:rPr lang="es-ES" sz="2400" dirty="0" err="1"/>
               <a:t>Tasks</a:t>
             </a:r>
-            <a:endParaRPr lang="es-ES" dirty="0"/>
+            <a:endParaRPr lang="es-ES" sz="2400" dirty="0"/>
           </a:p>
           <a:p>
             <a:pPr marL="285750" indent="-285750">
@@ -4570,13 +6203,10 @@
               <a:buChar char="•"/>
             </a:pPr>
             <a:r>
-              <a:rPr lang="es-ES" dirty="0" err="1"/>
+              <a:rPr lang="es-ES" sz="2400" dirty="0" err="1"/>
               <a:t>Team</a:t>
             </a:r>
-            <a:r>
-              <a:rPr lang="es-ES" dirty="0"/>
-              <a:t>/s</a:t>
-            </a:r>
+            <a:endParaRPr lang="es-ES" sz="2400" dirty="0"/>
           </a:p>
           <a:p>
             <a:pPr marL="285750" indent="-285750">
@@ -4584,10 +6214,10 @@
               <a:buChar char="•"/>
             </a:pPr>
             <a:r>
-              <a:rPr lang="es-ES" dirty="0" err="1"/>
+              <a:rPr lang="es-ES" sz="2400" dirty="0" err="1"/>
               <a:t>Settings</a:t>
             </a:r>
-            <a:endParaRPr lang="es-ES" dirty="0"/>
+            <a:endParaRPr lang="es-ES" sz="2400" dirty="0"/>
           </a:p>
         </p:txBody>
       </p:sp>
@@ -4866,7 +6496,7 @@
                             </p:stCondLst>
                             <p:childTnLst>
                               <p:par>
-                                <p:cTn id="25" presetID="1" presetClass="entr" presetSubtype="0" fill="hold" grpId="0" nodeType="clickEffect">
+                                <p:cTn id="25" presetID="1" presetClass="entr" presetSubtype="0" fill="hold" nodeType="clickEffect">
                                   <p:stCondLst>
                                     <p:cond delay="0"/>
                                   </p:stCondLst>
@@ -4879,11 +6509,7 @@
                                           </p:stCondLst>
                                         </p:cTn>
                                         <p:tgtEl>
-                                          <p:spTgt spid="3">
-                                            <p:txEl>
-                                              <p:pRg st="0" end="0"/>
-                                            </p:txEl>
-                                          </p:spTgt>
+                                          <p:spTgt spid="6"/>
                                         </p:tgtEl>
                                         <p:attrNameLst>
                                           <p:attrName>style.visibility</p:attrName>
@@ -4924,7 +6550,6 @@
       </p:par>
     </p:tnLst>
     <p:bldLst>
-      <p:bldP spid="3" grpId="0" build="p"/>
       <p:bldP spid="4" grpId="0" uiExpand="1" build="p"/>
     </p:bldLst>
   </p:timing>
@@ -4970,49 +6595,413 @@
           <a:lstStyle/>
           <a:p>
             <a:r>
+              <a:rPr lang="es-ES" dirty="0" err="1"/>
+              <a:t>AppBar</a:t>
+            </a:r>
+            <a:r>
               <a:rPr lang="es-ES" dirty="0"/>
-              <a:t>[Ej. </a:t>
+              <a:t> &amp; </a:t>
             </a:r>
             <a:r>
               <a:rPr lang="es-ES" dirty="0" err="1"/>
-              <a:t>Codigo</a:t>
+              <a:t>NavBar</a:t>
             </a:r>
             <a:r>
               <a:rPr lang="es-ES" dirty="0"/>
-              <a:t>]</a:t>
-            </a:r>
-          </a:p>
-        </p:txBody>
-      </p:sp>
-      <p:sp>
-        <p:nvSpPr>
-          <p:cNvPr id="3" name="Marcador de contenido 2">
+              <a:t> - Diseño</a:t>
+            </a:r>
+          </a:p>
+        </p:txBody>
+      </p:sp>
+      <p:pic>
+        <p:nvPicPr>
+          <p:cNvPr id="7" name="Imagen 6">
             <a:extLst>
               <a:ext uri="{FF2B5EF4-FFF2-40B4-BE49-F238E27FC236}">
-                <a16:creationId xmlns:a16="http://schemas.microsoft.com/office/drawing/2014/main" id="{ED5FFFF8-E61A-7522-32C5-5D0440BA4AD1}"/>
+                <a16:creationId xmlns:a16="http://schemas.microsoft.com/office/drawing/2014/main" id="{A509DAE4-BCE6-8085-29DB-EE5C9C6DC405}"/>
               </a:ext>
             </a:extLst>
           </p:cNvPr>
-          <p:cNvSpPr>
-            <a:spLocks noGrp="1"/>
-          </p:cNvSpPr>
-          <p:nvPr>
-            <p:ph idx="1"/>
-          </p:nvPr>
-        </p:nvSpPr>
-        <p:spPr/>
-        <p:txBody>
-          <a:bodyPr/>
-          <a:lstStyle/>
-          <a:p>
-            <a:endParaRPr lang="es-ES" dirty="0"/>
-          </a:p>
-        </p:txBody>
-      </p:sp>
+          <p:cNvPicPr>
+            <a:picLocks noChangeAspect="1"/>
+          </p:cNvPicPr>
+          <p:nvPr/>
+        </p:nvPicPr>
+        <p:blipFill>
+          <a:blip r:embed="rId2"/>
+          <a:stretch>
+            <a:fillRect/>
+          </a:stretch>
+        </p:blipFill>
+        <p:spPr>
+          <a:xfrm>
+            <a:off x="190500" y="1596342"/>
+            <a:ext cx="5506218" cy="4896533"/>
+          </a:xfrm>
+          <a:prstGeom prst="rect">
+            <a:avLst/>
+          </a:prstGeom>
+        </p:spPr>
+      </p:pic>
+      <p:pic>
+        <p:nvPicPr>
+          <p:cNvPr id="9" name="Imagen 8">
+            <a:extLst>
+              <a:ext uri="{FF2B5EF4-FFF2-40B4-BE49-F238E27FC236}">
+                <a16:creationId xmlns:a16="http://schemas.microsoft.com/office/drawing/2014/main" id="{4DAD55BA-8418-C024-604A-727C5A8624C8}"/>
+              </a:ext>
+            </a:extLst>
+          </p:cNvPr>
+          <p:cNvPicPr>
+            <a:picLocks noChangeAspect="1"/>
+          </p:cNvPicPr>
+          <p:nvPr/>
+        </p:nvPicPr>
+        <p:blipFill>
+          <a:blip r:embed="rId3"/>
+          <a:stretch>
+            <a:fillRect/>
+          </a:stretch>
+        </p:blipFill>
+        <p:spPr>
+          <a:xfrm>
+            <a:off x="5866533" y="1780872"/>
+            <a:ext cx="6211167" cy="4344006"/>
+          </a:xfrm>
+          <a:prstGeom prst="rect">
+            <a:avLst/>
+          </a:prstGeom>
+        </p:spPr>
+      </p:pic>
     </p:spTree>
     <p:extLst>
       <p:ext uri="{BB962C8B-B14F-4D97-AF65-F5344CB8AC3E}">
         <p14:creationId xmlns:p14="http://schemas.microsoft.com/office/powerpoint/2010/main" val="1055039565"/>
+      </p:ext>
+    </p:extLst>
+  </p:cSld>
+  <p:clrMapOvr>
+    <a:masterClrMapping/>
+  </p:clrMapOvr>
+</p:sld>
+</file>
+
+<file path=ppt/slides/slide8.xml><?xml version="1.0" encoding="utf-8"?>
+<p:sld xmlns:a="http://schemas.openxmlformats.org/drawingml/2006/main" xmlns:r="http://schemas.openxmlformats.org/officeDocument/2006/relationships" xmlns:p="http://schemas.openxmlformats.org/presentationml/2006/main">
+  <p:cSld>
+    <p:spTree>
+      <p:nvGrpSpPr>
+        <p:cNvPr id="1" name="">
+          <a:extLst>
+            <a:ext uri="{FF2B5EF4-FFF2-40B4-BE49-F238E27FC236}">
+              <a16:creationId xmlns:a16="http://schemas.microsoft.com/office/drawing/2014/main" id="{3FF8B14C-417F-9715-7910-E1E4718F01D7}"/>
+            </a:ext>
+          </a:extLst>
+        </p:cNvPr>
+        <p:cNvGrpSpPr/>
+        <p:nvPr/>
+      </p:nvGrpSpPr>
+      <p:grpSpPr>
+        <a:xfrm>
+          <a:off x="0" y="0"/>
+          <a:ext cx="0" cy="0"/>
+          <a:chOff x="0" y="0"/>
+          <a:chExt cx="0" cy="0"/>
+        </a:xfrm>
+      </p:grpSpPr>
+      <p:sp>
+        <p:nvSpPr>
+          <p:cNvPr id="2" name="Título 1">
+            <a:extLst>
+              <a:ext uri="{FF2B5EF4-FFF2-40B4-BE49-F238E27FC236}">
+                <a16:creationId xmlns:a16="http://schemas.microsoft.com/office/drawing/2014/main" id="{F82560C7-E26D-FF27-4682-8DDEE5FCA122}"/>
+              </a:ext>
+            </a:extLst>
+          </p:cNvPr>
+          <p:cNvSpPr>
+            <a:spLocks noGrp="1"/>
+          </p:cNvSpPr>
+          <p:nvPr>
+            <p:ph type="title"/>
+          </p:nvPr>
+        </p:nvSpPr>
+        <p:spPr/>
+        <p:txBody>
+          <a:bodyPr/>
+          <a:lstStyle/>
+          <a:p>
+            <a:r>
+              <a:rPr lang="es-ES" dirty="0" err="1"/>
+              <a:t>AppBar</a:t>
+            </a:r>
+            <a:r>
+              <a:rPr lang="es-ES" dirty="0"/>
+              <a:t> &amp; </a:t>
+            </a:r>
+            <a:r>
+              <a:rPr lang="es-ES" dirty="0" err="1"/>
+              <a:t>NavBar</a:t>
+            </a:r>
+            <a:r>
+              <a:rPr lang="es-ES" dirty="0"/>
+              <a:t> - Lógica</a:t>
+            </a:r>
+          </a:p>
+        </p:txBody>
+      </p:sp>
+      <p:pic>
+        <p:nvPicPr>
+          <p:cNvPr id="5" name="Imagen 4">
+            <a:extLst>
+              <a:ext uri="{FF2B5EF4-FFF2-40B4-BE49-F238E27FC236}">
+                <a16:creationId xmlns:a16="http://schemas.microsoft.com/office/drawing/2014/main" id="{37DAA16D-7632-25B8-0A47-76BE36C3A0E5}"/>
+              </a:ext>
+            </a:extLst>
+          </p:cNvPr>
+          <p:cNvPicPr>
+            <a:picLocks noChangeAspect="1"/>
+          </p:cNvPicPr>
+          <p:nvPr/>
+        </p:nvPicPr>
+        <p:blipFill>
+          <a:blip r:embed="rId2"/>
+          <a:stretch>
+            <a:fillRect/>
+          </a:stretch>
+        </p:blipFill>
+        <p:spPr>
+          <a:xfrm>
+            <a:off x="257175" y="1690688"/>
+            <a:ext cx="5201376" cy="4906060"/>
+          </a:xfrm>
+          <a:prstGeom prst="rect">
+            <a:avLst/>
+          </a:prstGeom>
+        </p:spPr>
+      </p:pic>
+      <p:pic>
+        <p:nvPicPr>
+          <p:cNvPr id="11" name="Imagen 10">
+            <a:extLst>
+              <a:ext uri="{FF2B5EF4-FFF2-40B4-BE49-F238E27FC236}">
+                <a16:creationId xmlns:a16="http://schemas.microsoft.com/office/drawing/2014/main" id="{DA2078CE-A0F5-CBF9-AA98-0E97B064A22A}"/>
+              </a:ext>
+            </a:extLst>
+          </p:cNvPr>
+          <p:cNvPicPr>
+            <a:picLocks noChangeAspect="1"/>
+          </p:cNvPicPr>
+          <p:nvPr/>
+        </p:nvPicPr>
+        <p:blipFill>
+          <a:blip r:embed="rId3"/>
+          <a:stretch>
+            <a:fillRect/>
+          </a:stretch>
+        </p:blipFill>
+        <p:spPr>
+          <a:xfrm>
+            <a:off x="6295319" y="1319161"/>
+            <a:ext cx="5058481" cy="5277587"/>
+          </a:xfrm>
+          <a:prstGeom prst="rect">
+            <a:avLst/>
+          </a:prstGeom>
+        </p:spPr>
+      </p:pic>
+    </p:spTree>
+    <p:extLst>
+      <p:ext uri="{BB962C8B-B14F-4D97-AF65-F5344CB8AC3E}">
+        <p14:creationId xmlns:p14="http://schemas.microsoft.com/office/powerpoint/2010/main" val="4121590501"/>
+      </p:ext>
+    </p:extLst>
+  </p:cSld>
+  <p:clrMapOvr>
+    <a:masterClrMapping/>
+  </p:clrMapOvr>
+</p:sld>
+</file>
+
+<file path=ppt/slides/slide9.xml><?xml version="1.0" encoding="utf-8"?>
+<p:sld xmlns:a="http://schemas.openxmlformats.org/drawingml/2006/main" xmlns:r="http://schemas.openxmlformats.org/officeDocument/2006/relationships" xmlns:p="http://schemas.openxmlformats.org/presentationml/2006/main">
+  <p:cSld>
+    <p:spTree>
+      <p:nvGrpSpPr>
+        <p:cNvPr id="1" name="">
+          <a:extLst>
+            <a:ext uri="{FF2B5EF4-FFF2-40B4-BE49-F238E27FC236}">
+              <a16:creationId xmlns:a16="http://schemas.microsoft.com/office/drawing/2014/main" id="{458D6C71-9FE7-2896-C58D-C9FB3C506C9F}"/>
+            </a:ext>
+          </a:extLst>
+        </p:cNvPr>
+        <p:cNvGrpSpPr/>
+        <p:nvPr/>
+      </p:nvGrpSpPr>
+      <p:grpSpPr>
+        <a:xfrm>
+          <a:off x="0" y="0"/>
+          <a:ext cx="0" cy="0"/>
+          <a:chOff x="0" y="0"/>
+          <a:chExt cx="0" cy="0"/>
+        </a:xfrm>
+      </p:grpSpPr>
+      <p:sp>
+        <p:nvSpPr>
+          <p:cNvPr id="2" name="Título 1">
+            <a:extLst>
+              <a:ext uri="{FF2B5EF4-FFF2-40B4-BE49-F238E27FC236}">
+                <a16:creationId xmlns:a16="http://schemas.microsoft.com/office/drawing/2014/main" id="{047AF359-0A25-4B94-8869-17DBF6D5E046}"/>
+              </a:ext>
+            </a:extLst>
+          </p:cNvPr>
+          <p:cNvSpPr>
+            <a:spLocks noGrp="1"/>
+          </p:cNvSpPr>
+          <p:nvPr>
+            <p:ph type="title"/>
+          </p:nvPr>
+        </p:nvSpPr>
+        <p:spPr/>
+        <p:txBody>
+          <a:bodyPr/>
+          <a:lstStyle/>
+          <a:p>
+            <a:r>
+              <a:rPr lang="es-ES" dirty="0"/>
+              <a:t>Error de </a:t>
+            </a:r>
+            <a:r>
+              <a:rPr lang="es-ES" dirty="0" err="1"/>
+              <a:t>NavBar</a:t>
+            </a:r>
+            <a:endParaRPr lang="es-ES" dirty="0"/>
+          </a:p>
+        </p:txBody>
+      </p:sp>
+      <p:pic>
+        <p:nvPicPr>
+          <p:cNvPr id="6" name="Imagen 5">
+            <a:extLst>
+              <a:ext uri="{FF2B5EF4-FFF2-40B4-BE49-F238E27FC236}">
+                <a16:creationId xmlns:a16="http://schemas.microsoft.com/office/drawing/2014/main" id="{BCA484A0-0A2A-C73B-D783-27BF6B226196}"/>
+              </a:ext>
+            </a:extLst>
+          </p:cNvPr>
+          <p:cNvPicPr>
+            <a:picLocks noChangeAspect="1"/>
+          </p:cNvPicPr>
+          <p:nvPr/>
+        </p:nvPicPr>
+        <p:blipFill>
+          <a:blip r:embed="rId2"/>
+          <a:stretch>
+            <a:fillRect/>
+          </a:stretch>
+        </p:blipFill>
+        <p:spPr>
+          <a:xfrm>
+            <a:off x="838200" y="1519214"/>
+            <a:ext cx="5849166" cy="342948"/>
+          </a:xfrm>
+          <a:prstGeom prst="rect">
+            <a:avLst/>
+          </a:prstGeom>
+        </p:spPr>
+      </p:pic>
+      <p:pic>
+        <p:nvPicPr>
+          <p:cNvPr id="8" name="Imagen 7">
+            <a:extLst>
+              <a:ext uri="{FF2B5EF4-FFF2-40B4-BE49-F238E27FC236}">
+                <a16:creationId xmlns:a16="http://schemas.microsoft.com/office/drawing/2014/main" id="{0B76A03F-E1A0-B2D4-A025-E234C10C5413}"/>
+              </a:ext>
+            </a:extLst>
+          </p:cNvPr>
+          <p:cNvPicPr>
+            <a:picLocks noChangeAspect="1"/>
+          </p:cNvPicPr>
+          <p:nvPr/>
+        </p:nvPicPr>
+        <p:blipFill>
+          <a:blip r:embed="rId3"/>
+          <a:stretch>
+            <a:fillRect/>
+          </a:stretch>
+        </p:blipFill>
+        <p:spPr>
+          <a:xfrm>
+            <a:off x="838200" y="2014098"/>
+            <a:ext cx="5763429" cy="1324160"/>
+          </a:xfrm>
+          <a:prstGeom prst="rect">
+            <a:avLst/>
+          </a:prstGeom>
+        </p:spPr>
+      </p:pic>
+      <p:pic>
+        <p:nvPicPr>
+          <p:cNvPr id="10" name="Imagen 9">
+            <a:extLst>
+              <a:ext uri="{FF2B5EF4-FFF2-40B4-BE49-F238E27FC236}">
+                <a16:creationId xmlns:a16="http://schemas.microsoft.com/office/drawing/2014/main" id="{5D69998C-E642-9622-59E2-74A0D6962E00}"/>
+              </a:ext>
+            </a:extLst>
+          </p:cNvPr>
+          <p:cNvPicPr>
+            <a:picLocks noChangeAspect="1"/>
+          </p:cNvPicPr>
+          <p:nvPr/>
+        </p:nvPicPr>
+        <p:blipFill>
+          <a:blip r:embed="rId4"/>
+          <a:stretch>
+            <a:fillRect/>
+          </a:stretch>
+        </p:blipFill>
+        <p:spPr>
+          <a:xfrm>
+            <a:off x="838200" y="3490194"/>
+            <a:ext cx="4686954" cy="1486107"/>
+          </a:xfrm>
+          <a:prstGeom prst="rect">
+            <a:avLst/>
+          </a:prstGeom>
+        </p:spPr>
+      </p:pic>
+      <p:pic>
+        <p:nvPicPr>
+          <p:cNvPr id="12" name="Imagen 11">
+            <a:extLst>
+              <a:ext uri="{FF2B5EF4-FFF2-40B4-BE49-F238E27FC236}">
+                <a16:creationId xmlns:a16="http://schemas.microsoft.com/office/drawing/2014/main" id="{51F93B31-F070-4090-640F-50D749CDD976}"/>
+              </a:ext>
+            </a:extLst>
+          </p:cNvPr>
+          <p:cNvPicPr>
+            <a:picLocks noChangeAspect="1"/>
+          </p:cNvPicPr>
+          <p:nvPr/>
+        </p:nvPicPr>
+        <p:blipFill>
+          <a:blip r:embed="rId5"/>
+          <a:stretch>
+            <a:fillRect/>
+          </a:stretch>
+        </p:blipFill>
+        <p:spPr>
+          <a:xfrm>
+            <a:off x="838200" y="5128237"/>
+            <a:ext cx="3639058" cy="257211"/>
+          </a:xfrm>
+          <a:prstGeom prst="rect">
+            <a:avLst/>
+          </a:prstGeom>
+        </p:spPr>
+      </p:pic>
+    </p:spTree>
+    <p:extLst>
+      <p:ext uri="{BB962C8B-B14F-4D97-AF65-F5344CB8AC3E}">
+        <p14:creationId xmlns:p14="http://schemas.microsoft.com/office/powerpoint/2010/main" val="3599052161"/>
       </p:ext>
     </p:extLst>
   </p:cSld>

</xml_diff>

<commit_message>
Lo trabajado en clase el 24/02/2025
</commit_message>
<xml_diff>
--- a/ASIGNATURAS/PM/PRACTICA/Ficheros-de-entregas/Presentacion-Proyecto-Macarena.pptx
+++ b/ASIGNATURAS/PM/PRACTICA/Ficheros-de-entregas/Presentacion-Proyecto-Macarena.pptx
@@ -23,9 +23,9 @@
     <p:sldId id="271" r:id="rId17"/>
     <p:sldId id="273" r:id="rId18"/>
     <p:sldId id="274" r:id="rId19"/>
-    <p:sldId id="275" r:id="rId20"/>
-    <p:sldId id="276" r:id="rId21"/>
-    <p:sldId id="277" r:id="rId22"/>
+    <p:sldId id="277" r:id="rId20"/>
+    <p:sldId id="275" r:id="rId21"/>
+    <p:sldId id="276" r:id="rId22"/>
   </p:sldIdLst>
   <p:sldSz cx="12192000" cy="6858000"/>
   <p:notesSz cx="6858000" cy="9144000"/>
@@ -263,7 +263,7 @@
           <a:p>
             <a:fld id="{3084FAAB-48E5-491E-985D-A80EB3A63567}" type="datetimeFigureOut">
               <a:rPr lang="es-ES" smtClean="0"/>
-              <a:t>21/02/2025</a:t>
+              <a:t>24/02/2025</a:t>
             </a:fld>
             <a:endParaRPr lang="es-ES"/>
           </a:p>
@@ -433,7 +433,7 @@
           <a:p>
             <a:fld id="{3084FAAB-48E5-491E-985D-A80EB3A63567}" type="datetimeFigureOut">
               <a:rPr lang="es-ES" smtClean="0"/>
-              <a:t>21/02/2025</a:t>
+              <a:t>24/02/2025</a:t>
             </a:fld>
             <a:endParaRPr lang="es-ES"/>
           </a:p>
@@ -613,7 +613,7 @@
           <a:p>
             <a:fld id="{3084FAAB-48E5-491E-985D-A80EB3A63567}" type="datetimeFigureOut">
               <a:rPr lang="es-ES" smtClean="0"/>
-              <a:t>21/02/2025</a:t>
+              <a:t>24/02/2025</a:t>
             </a:fld>
             <a:endParaRPr lang="es-ES"/>
           </a:p>
@@ -783,7 +783,7 @@
           <a:p>
             <a:fld id="{3084FAAB-48E5-491E-985D-A80EB3A63567}" type="datetimeFigureOut">
               <a:rPr lang="es-ES" smtClean="0"/>
-              <a:t>21/02/2025</a:t>
+              <a:t>24/02/2025</a:t>
             </a:fld>
             <a:endParaRPr lang="es-ES"/>
           </a:p>
@@ -1029,7 +1029,7 @@
           <a:p>
             <a:fld id="{3084FAAB-48E5-491E-985D-A80EB3A63567}" type="datetimeFigureOut">
               <a:rPr lang="es-ES" smtClean="0"/>
-              <a:t>21/02/2025</a:t>
+              <a:t>24/02/2025</a:t>
             </a:fld>
             <a:endParaRPr lang="es-ES"/>
           </a:p>
@@ -1261,7 +1261,7 @@
           <a:p>
             <a:fld id="{3084FAAB-48E5-491E-985D-A80EB3A63567}" type="datetimeFigureOut">
               <a:rPr lang="es-ES" smtClean="0"/>
-              <a:t>21/02/2025</a:t>
+              <a:t>24/02/2025</a:t>
             </a:fld>
             <a:endParaRPr lang="es-ES"/>
           </a:p>
@@ -1628,7 +1628,7 @@
           <a:p>
             <a:fld id="{3084FAAB-48E5-491E-985D-A80EB3A63567}" type="datetimeFigureOut">
               <a:rPr lang="es-ES" smtClean="0"/>
-              <a:t>21/02/2025</a:t>
+              <a:t>24/02/2025</a:t>
             </a:fld>
             <a:endParaRPr lang="es-ES"/>
           </a:p>
@@ -1746,7 +1746,7 @@
           <a:p>
             <a:fld id="{3084FAAB-48E5-491E-985D-A80EB3A63567}" type="datetimeFigureOut">
               <a:rPr lang="es-ES" smtClean="0"/>
-              <a:t>21/02/2025</a:t>
+              <a:t>24/02/2025</a:t>
             </a:fld>
             <a:endParaRPr lang="es-ES"/>
           </a:p>
@@ -1841,7 +1841,7 @@
           <a:p>
             <a:fld id="{3084FAAB-48E5-491E-985D-A80EB3A63567}" type="datetimeFigureOut">
               <a:rPr lang="es-ES" smtClean="0"/>
-              <a:t>21/02/2025</a:t>
+              <a:t>24/02/2025</a:t>
             </a:fld>
             <a:endParaRPr lang="es-ES"/>
           </a:p>
@@ -2118,7 +2118,7 @@
           <a:p>
             <a:fld id="{3084FAAB-48E5-491E-985D-A80EB3A63567}" type="datetimeFigureOut">
               <a:rPr lang="es-ES" smtClean="0"/>
-              <a:t>21/02/2025</a:t>
+              <a:t>24/02/2025</a:t>
             </a:fld>
             <a:endParaRPr lang="es-ES"/>
           </a:p>
@@ -2375,7 +2375,7 @@
           <a:p>
             <a:fld id="{3084FAAB-48E5-491E-985D-A80EB3A63567}" type="datetimeFigureOut">
               <a:rPr lang="es-ES" smtClean="0"/>
-              <a:t>21/02/2025</a:t>
+              <a:t>24/02/2025</a:t>
             </a:fld>
             <a:endParaRPr lang="es-ES"/>
           </a:p>
@@ -2588,7 +2588,7 @@
           <a:p>
             <a:fld id="{3084FAAB-48E5-491E-985D-A80EB3A63567}" type="datetimeFigureOut">
               <a:rPr lang="es-ES" smtClean="0"/>
-              <a:t>21/02/2025</a:t>
+              <a:t>24/02/2025</a:t>
             </a:fld>
             <a:endParaRPr lang="es-ES"/>
           </a:p>
@@ -4362,13 +4362,7 @@
   <p:cSld>
     <p:spTree>
       <p:nvGrpSpPr>
-        <p:cNvPr id="1" name="">
-          <a:extLst>
-            <a:ext uri="{FF2B5EF4-FFF2-40B4-BE49-F238E27FC236}">
-              <a16:creationId xmlns:a16="http://schemas.microsoft.com/office/drawing/2014/main" id="{942D2799-2930-EE06-39E0-F0138E35E1FF}"/>
-            </a:ext>
-          </a:extLst>
-        </p:cNvPr>
+        <p:cNvPr id="1" name=""/>
         <p:cNvGrpSpPr/>
         <p:nvPr/>
       </p:nvGrpSpPr>
@@ -4385,7 +4379,7 @@
           <p:cNvPr id="2" name="Título 1">
             <a:extLst>
               <a:ext uri="{FF2B5EF4-FFF2-40B4-BE49-F238E27FC236}">
-                <a16:creationId xmlns:a16="http://schemas.microsoft.com/office/drawing/2014/main" id="{509D26C8-CBAE-F80B-D880-288C807AC6AE}"/>
+                <a16:creationId xmlns:a16="http://schemas.microsoft.com/office/drawing/2014/main" id="{724BEB4F-D29F-07A1-2518-4855F0CF39D0}"/>
               </a:ext>
             </a:extLst>
           </p:cNvPr>
@@ -4403,15 +4397,86 @@
           <a:p>
             <a:r>
               <a:rPr lang="es-ES" dirty="0"/>
-              <a:t>[Ej. Código]</a:t>
-            </a:r>
+              <a:t>Evolución a Futuro</a:t>
+            </a:r>
+          </a:p>
+        </p:txBody>
+      </p:sp>
+      <p:sp>
+        <p:nvSpPr>
+          <p:cNvPr id="3" name="Marcador de contenido 2">
+            <a:extLst>
+              <a:ext uri="{FF2B5EF4-FFF2-40B4-BE49-F238E27FC236}">
+                <a16:creationId xmlns:a16="http://schemas.microsoft.com/office/drawing/2014/main" id="{03FC43B1-2BC0-C176-1BD7-4589A8CD8826}"/>
+              </a:ext>
+            </a:extLst>
+          </p:cNvPr>
+          <p:cNvSpPr>
+            <a:spLocks noGrp="1"/>
+          </p:cNvSpPr>
+          <p:nvPr>
+            <p:ph idx="1"/>
+          </p:nvPr>
+        </p:nvSpPr>
+        <p:spPr/>
+        <p:txBody>
+          <a:bodyPr/>
+          <a:lstStyle/>
+          <a:p>
+            <a:r>
+              <a:rPr lang="es-ES" dirty="0" err="1"/>
+              <a:t>Activities</a:t>
+            </a:r>
+            <a:r>
+              <a:rPr lang="es-ES" dirty="0"/>
+              <a:t> &gt;&gt; </a:t>
+            </a:r>
+            <a:r>
+              <a:rPr lang="es-ES" dirty="0" err="1"/>
+              <a:t>Fragments</a:t>
+            </a:r>
+            <a:endParaRPr lang="es-ES" dirty="0"/>
+          </a:p>
+          <a:p>
+            <a:r>
+              <a:rPr lang="es-ES" dirty="0"/>
+              <a:t>Añadir varios temas (</a:t>
+            </a:r>
+            <a:r>
+              <a:rPr lang="es-ES" dirty="0" err="1"/>
+              <a:t>Settings</a:t>
+            </a:r>
+            <a:r>
+              <a:rPr lang="es-ES" dirty="0"/>
+              <a:t>)</a:t>
+            </a:r>
+          </a:p>
+          <a:p>
+            <a:r>
+              <a:rPr lang="es-ES" dirty="0"/>
+              <a:t>Añadir opciones de adaptabilidad</a:t>
+            </a:r>
+          </a:p>
+          <a:p>
+            <a:r>
+              <a:rPr lang="es-ES" dirty="0"/>
+              <a:t>Usar listas dinámicas y </a:t>
+            </a:r>
+            <a:r>
+              <a:rPr lang="es-ES" dirty="0" err="1"/>
+              <a:t>Fragments</a:t>
+            </a:r>
+            <a:endParaRPr lang="es-ES" dirty="0"/>
+          </a:p>
+          <a:p>
+            <a:endParaRPr lang="es-ES" dirty="0"/>
           </a:p>
         </p:txBody>
       </p:sp>
     </p:spTree>
     <p:extLst>
       <p:ext uri="{BB962C8B-B14F-4D97-AF65-F5344CB8AC3E}">
-        <p14:creationId xmlns:p14="http://schemas.microsoft.com/office/powerpoint/2010/main" val="1876061896"/>
+        <p14:creationId xmlns:p14="http://schemas.microsoft.com/office/powerpoint/2010/main" val="3783462933"/>
       </p:ext>
     </p:extLst>
   </p:cSld>
@@ -4499,6 +4564,15 @@
               <a:rPr lang="es-ES" sz="3600" b="1" dirty="0"/>
               <a:t>NO espero aprobar</a:t>
             </a:r>
+          </a:p>
+          <a:p>
+            <a:r>
+              <a:rPr lang="es-ES" sz="3600" b="1" dirty="0"/>
+              <a:t>SI, el diseño es adrede</a:t>
+            </a:r>
+          </a:p>
+          <a:p>
+            <a:endParaRPr lang="es-ES" sz="3600" b="1" dirty="0"/>
           </a:p>
         </p:txBody>
       </p:sp>
@@ -4562,7 +4636,7 @@
                                     </p:set>
                                     <p:animEffect transition="in" filter="fade">
                                       <p:cBhvr>
-                                        <p:cTn id="7" dur="1000"/>
+                                        <p:cTn id="7" dur="500"/>
                                         <p:tgtEl>
                                           <p:spTgt spid="3">
                                             <p:txEl>
@@ -4623,11 +4697,72 @@
                                     </p:set>
                                     <p:animEffect transition="in" filter="fade">
                                       <p:cBhvr>
-                                        <p:cTn id="12" dur="1000"/>
+                                        <p:cTn id="12" dur="500"/>
                                         <p:tgtEl>
                                           <p:spTgt spid="3">
                                             <p:txEl>
                                               <p:pRg st="1" end="1"/>
+                                            </p:txEl>
+                                          </p:spTgt>
+                                        </p:tgtEl>
+                                      </p:cBhvr>
+                                    </p:animEffect>
+                                  </p:childTnLst>
+                                </p:cTn>
+                              </p:par>
+                            </p:childTnLst>
+                          </p:cTn>
+                        </p:par>
+                      </p:childTnLst>
+                    </p:cTn>
+                  </p:par>
+                  <p:par>
+                    <p:cTn id="13" fill="hold">
+                      <p:stCondLst>
+                        <p:cond delay="indefinite"/>
+                      </p:stCondLst>
+                      <p:childTnLst>
+                        <p:par>
+                          <p:cTn id="14" fill="hold">
+                            <p:stCondLst>
+                              <p:cond delay="0"/>
+                            </p:stCondLst>
+                            <p:childTnLst>
+                              <p:par>
+                                <p:cTn id="15" presetID="10" presetClass="entr" presetSubtype="0" fill="hold" grpId="0" nodeType="clickEffect">
+                                  <p:stCondLst>
+                                    <p:cond delay="0"/>
+                                  </p:stCondLst>
+                                  <p:childTnLst>
+                                    <p:set>
+                                      <p:cBhvr>
+                                        <p:cTn id="16" dur="1" fill="hold">
+                                          <p:stCondLst>
+                                            <p:cond delay="0"/>
+                                          </p:stCondLst>
+                                        </p:cTn>
+                                        <p:tgtEl>
+                                          <p:spTgt spid="3">
+                                            <p:txEl>
+                                              <p:pRg st="2" end="2"/>
+                                            </p:txEl>
+                                          </p:spTgt>
+                                        </p:tgtEl>
+                                        <p:attrNameLst>
+                                          <p:attrName>style.visibility</p:attrName>
+                                        </p:attrNameLst>
+                                      </p:cBhvr>
+                                      <p:to>
+                                        <p:strVal val="visible"/>
+                                      </p:to>
+                                    </p:set>
+                                    <p:animEffect transition="in" filter="fade">
+                                      <p:cBhvr>
+                                        <p:cTn id="17" dur="500"/>
+                                        <p:tgtEl>
+                                          <p:spTgt spid="3">
+                                            <p:txEl>
+                                              <p:pRg st="2" end="2"/>
                                             </p:txEl>
                                           </p:spTgt>
                                         </p:tgtEl>
@@ -4678,6 +4813,70 @@
         <p:cNvPr id="1" name="">
           <a:extLst>
             <a:ext uri="{FF2B5EF4-FFF2-40B4-BE49-F238E27FC236}">
+              <a16:creationId xmlns:a16="http://schemas.microsoft.com/office/drawing/2014/main" id="{942D2799-2930-EE06-39E0-F0138E35E1FF}"/>
+            </a:ext>
+          </a:extLst>
+        </p:cNvPr>
+        <p:cNvGrpSpPr/>
+        <p:nvPr/>
+      </p:nvGrpSpPr>
+      <p:grpSpPr>
+        <a:xfrm>
+          <a:off x="0" y="0"/>
+          <a:ext cx="0" cy="0"/>
+          <a:chOff x="0" y="0"/>
+          <a:chExt cx="0" cy="0"/>
+        </a:xfrm>
+      </p:grpSpPr>
+      <p:sp>
+        <p:nvSpPr>
+          <p:cNvPr id="2" name="Título 1">
+            <a:extLst>
+              <a:ext uri="{FF2B5EF4-FFF2-40B4-BE49-F238E27FC236}">
+                <a16:creationId xmlns:a16="http://schemas.microsoft.com/office/drawing/2014/main" id="{509D26C8-CBAE-F80B-D880-288C807AC6AE}"/>
+              </a:ext>
+            </a:extLst>
+          </p:cNvPr>
+          <p:cNvSpPr>
+            <a:spLocks noGrp="1"/>
+          </p:cNvSpPr>
+          <p:nvPr>
+            <p:ph type="title"/>
+          </p:nvPr>
+        </p:nvSpPr>
+        <p:spPr/>
+        <p:txBody>
+          <a:bodyPr/>
+          <a:lstStyle/>
+          <a:p>
+            <a:r>
+              <a:rPr lang="es-ES" dirty="0"/>
+              <a:t>[Ej. Código]</a:t>
+            </a:r>
+          </a:p>
+        </p:txBody>
+      </p:sp>
+    </p:spTree>
+    <p:extLst>
+      <p:ext uri="{BB962C8B-B14F-4D97-AF65-F5344CB8AC3E}">
+        <p14:creationId xmlns:p14="http://schemas.microsoft.com/office/powerpoint/2010/main" val="1876061896"/>
+      </p:ext>
+    </p:extLst>
+  </p:cSld>
+  <p:clrMapOvr>
+    <a:masterClrMapping/>
+  </p:clrMapOvr>
+</p:sld>
+</file>
+
+<file path=ppt/slides/slide21.xml><?xml version="1.0" encoding="utf-8"?>
+<p:sld xmlns:a="http://schemas.openxmlformats.org/drawingml/2006/main" xmlns:r="http://schemas.openxmlformats.org/officeDocument/2006/relationships" xmlns:p="http://schemas.openxmlformats.org/presentationml/2006/main">
+  <p:cSld>
+    <p:spTree>
+      <p:nvGrpSpPr>
+        <p:cNvPr id="1" name="">
+          <a:extLst>
+            <a:ext uri="{FF2B5EF4-FFF2-40B4-BE49-F238E27FC236}">
               <a16:creationId xmlns:a16="http://schemas.microsoft.com/office/drawing/2014/main" id="{CC960753-D393-F19F-F223-5901185830E8}"/>
             </a:ext>
           </a:extLst>
@@ -4725,132 +4924,6 @@
     <p:extLst>
       <p:ext uri="{BB962C8B-B14F-4D97-AF65-F5344CB8AC3E}">
         <p14:creationId xmlns:p14="http://schemas.microsoft.com/office/powerpoint/2010/main" val="1404060965"/>
-      </p:ext>
-    </p:extLst>
-  </p:cSld>
-  <p:clrMapOvr>
-    <a:masterClrMapping/>
-  </p:clrMapOvr>
-</p:sld>
-</file>
-
-<file path=ppt/slides/slide21.xml><?xml version="1.0" encoding="utf-8"?>
-<p:sld xmlns:a="http://schemas.openxmlformats.org/drawingml/2006/main" xmlns:r="http://schemas.openxmlformats.org/officeDocument/2006/relationships" xmlns:p="http://schemas.openxmlformats.org/presentationml/2006/main">
-  <p:cSld>
-    <p:spTree>
-      <p:nvGrpSpPr>
-        <p:cNvPr id="1" name=""/>
-        <p:cNvGrpSpPr/>
-        <p:nvPr/>
-      </p:nvGrpSpPr>
-      <p:grpSpPr>
-        <a:xfrm>
-          <a:off x="0" y="0"/>
-          <a:ext cx="0" cy="0"/>
-          <a:chOff x="0" y="0"/>
-          <a:chExt cx="0" cy="0"/>
-        </a:xfrm>
-      </p:grpSpPr>
-      <p:sp>
-        <p:nvSpPr>
-          <p:cNvPr id="2" name="Título 1">
-            <a:extLst>
-              <a:ext uri="{FF2B5EF4-FFF2-40B4-BE49-F238E27FC236}">
-                <a16:creationId xmlns:a16="http://schemas.microsoft.com/office/drawing/2014/main" id="{724BEB4F-D29F-07A1-2518-4855F0CF39D0}"/>
-              </a:ext>
-            </a:extLst>
-          </p:cNvPr>
-          <p:cNvSpPr>
-            <a:spLocks noGrp="1"/>
-          </p:cNvSpPr>
-          <p:nvPr>
-            <p:ph type="title"/>
-          </p:nvPr>
-        </p:nvSpPr>
-        <p:spPr/>
-        <p:txBody>
-          <a:bodyPr/>
-          <a:lstStyle/>
-          <a:p>
-            <a:r>
-              <a:rPr lang="es-ES" dirty="0"/>
-              <a:t>Añadir a Futuro</a:t>
-            </a:r>
-          </a:p>
-        </p:txBody>
-      </p:sp>
-      <p:sp>
-        <p:nvSpPr>
-          <p:cNvPr id="3" name="Marcador de contenido 2">
-            <a:extLst>
-              <a:ext uri="{FF2B5EF4-FFF2-40B4-BE49-F238E27FC236}">
-                <a16:creationId xmlns:a16="http://schemas.microsoft.com/office/drawing/2014/main" id="{03FC43B1-2BC0-C176-1BD7-4589A8CD8826}"/>
-              </a:ext>
-            </a:extLst>
-          </p:cNvPr>
-          <p:cNvSpPr>
-            <a:spLocks noGrp="1"/>
-          </p:cNvSpPr>
-          <p:nvPr>
-            <p:ph idx="1"/>
-          </p:nvPr>
-        </p:nvSpPr>
-        <p:spPr/>
-        <p:txBody>
-          <a:bodyPr/>
-          <a:lstStyle/>
-          <a:p>
-            <a:r>
-              <a:rPr lang="es-ES" dirty="0" err="1"/>
-              <a:t>Activities</a:t>
-            </a:r>
-            <a:r>
-              <a:rPr lang="es-ES" dirty="0"/>
-              <a:t> &gt;&gt; </a:t>
-            </a:r>
-            <a:r>
-              <a:rPr lang="es-ES" dirty="0" err="1"/>
-              <a:t>Fragments</a:t>
-            </a:r>
-            <a:endParaRPr lang="es-ES" dirty="0"/>
-          </a:p>
-          <a:p>
-            <a:r>
-              <a:rPr lang="es-ES" dirty="0"/>
-              <a:t>Añadir temas (</a:t>
-            </a:r>
-            <a:r>
-              <a:rPr lang="es-ES" dirty="0" err="1"/>
-              <a:t>Settings</a:t>
-            </a:r>
-            <a:r>
-              <a:rPr lang="es-ES" dirty="0"/>
-              <a:t>)</a:t>
-            </a:r>
-          </a:p>
-          <a:p>
-            <a:r>
-              <a:rPr lang="es-ES" dirty="0"/>
-              <a:t>Usar listas dinámicas + </a:t>
-            </a:r>
-            <a:r>
-              <a:rPr lang="es-ES" dirty="0" err="1"/>
-              <a:t>Fragments</a:t>
-            </a:r>
-            <a:endParaRPr lang="es-ES" dirty="0"/>
-          </a:p>
-          <a:p>
-            <a:r>
-              <a:rPr lang="es-ES" dirty="0"/>
-              <a:t> </a:t>
-            </a:r>
-          </a:p>
-        </p:txBody>
-      </p:sp>
-    </p:spTree>
-    <p:extLst>
-      <p:ext uri="{BB962C8B-B14F-4D97-AF65-F5344CB8AC3E}">
-        <p14:creationId xmlns:p14="http://schemas.microsoft.com/office/powerpoint/2010/main" val="3783462933"/>
       </p:ext>
     </p:extLst>
   </p:cSld>
@@ -5215,7 +5288,7 @@
                                     </p:set>
                                     <p:animEffect transition="in" filter="fade">
                                       <p:cBhvr>
-                                        <p:cTn id="7" dur="1000"/>
+                                        <p:cTn id="7" dur="500"/>
                                         <p:tgtEl>
                                           <p:spTgt spid="4">
                                             <p:txEl>
@@ -5276,7 +5349,7 @@
                                     </p:set>
                                     <p:animEffect transition="in" filter="fade">
                                       <p:cBhvr>
-                                        <p:cTn id="12" dur="1000"/>
+                                        <p:cTn id="12" dur="500"/>
                                         <p:tgtEl>
                                           <p:spTgt spid="6">
                                             <p:txEl>
@@ -5337,7 +5410,7 @@
                                     </p:set>
                                     <p:animEffect transition="in" filter="fade">
                                       <p:cBhvr>
-                                        <p:cTn id="17" dur="1000"/>
+                                        <p:cTn id="17" dur="500"/>
                                         <p:tgtEl>
                                           <p:spTgt spid="4">
                                             <p:txEl>
@@ -5398,7 +5471,7 @@
                                     </p:set>
                                     <p:animEffect transition="in" filter="fade">
                                       <p:cBhvr>
-                                        <p:cTn id="22" dur="1000"/>
+                                        <p:cTn id="22" dur="500"/>
                                         <p:tgtEl>
                                           <p:spTgt spid="6">
                                             <p:txEl>
@@ -5459,7 +5532,7 @@
                                     </p:set>
                                     <p:animEffect transition="in" filter="fade">
                                       <p:cBhvr>
-                                        <p:cTn id="27" dur="1000"/>
+                                        <p:cTn id="27" dur="500"/>
                                         <p:tgtEl>
                                           <p:spTgt spid="4">
                                             <p:txEl>
@@ -5520,7 +5593,7 @@
                                     </p:set>
                                     <p:animEffect transition="in" filter="fade">
                                       <p:cBhvr>
-                                        <p:cTn id="32" dur="1000"/>
+                                        <p:cTn id="32" dur="500"/>
                                         <p:tgtEl>
                                           <p:spTgt spid="6">
                                             <p:txEl>
@@ -5581,7 +5654,7 @@
                                     </p:set>
                                     <p:animEffect transition="in" filter="fade">
                                       <p:cBhvr>
-                                        <p:cTn id="37" dur="1000"/>
+                                        <p:cTn id="37" dur="500"/>
                                         <p:tgtEl>
                                           <p:spTgt spid="4">
                                             <p:txEl>
@@ -5642,7 +5715,7 @@
                                     </p:set>
                                     <p:animEffect transition="in" filter="fade">
                                       <p:cBhvr>
-                                        <p:cTn id="42" dur="1000"/>
+                                        <p:cTn id="42" dur="500"/>
                                         <p:tgtEl>
                                           <p:spTgt spid="6">
                                             <p:txEl>
@@ -5844,7 +5917,7 @@
                                     </p:set>
                                     <p:animEffect transition="in" filter="fade">
                                       <p:cBhvr>
-                                        <p:cTn id="7" dur="1000"/>
+                                        <p:cTn id="7" dur="500"/>
                                         <p:tgtEl>
                                           <p:spTgt spid="3">
                                             <p:txEl>
@@ -5905,7 +5978,7 @@
                                     </p:set>
                                     <p:animEffect transition="in" filter="fade">
                                       <p:cBhvr>
-                                        <p:cTn id="12" dur="1000"/>
+                                        <p:cTn id="12" dur="500"/>
                                         <p:tgtEl>
                                           <p:spTgt spid="3">
                                             <p:txEl>
@@ -5966,7 +6039,7 @@
                                     </p:set>
                                     <p:animEffect transition="in" filter="fade">
                                       <p:cBhvr>
-                                        <p:cTn id="17" dur="1000"/>
+                                        <p:cTn id="17" dur="500"/>
                                         <p:tgtEl>
                                           <p:spTgt spid="3">
                                             <p:txEl>
@@ -6027,7 +6100,7 @@
                                     </p:set>
                                     <p:animEffect transition="in" filter="fade">
                                       <p:cBhvr>
-                                        <p:cTn id="22" dur="1000"/>
+                                        <p:cTn id="22" dur="500"/>
                                         <p:tgtEl>
                                           <p:spTgt spid="3">
                                             <p:txEl>
@@ -6281,7 +6354,7 @@
                                     </p:set>
                                     <p:animEffect transition="in" filter="fade">
                                       <p:cBhvr>
-                                        <p:cTn id="7" dur="1000"/>
+                                        <p:cTn id="7" dur="500"/>
                                         <p:tgtEl>
                                           <p:spTgt spid="4">
                                             <p:txEl>
@@ -6342,7 +6415,7 @@
                                     </p:set>
                                     <p:animEffect transition="in" filter="fade">
                                       <p:cBhvr>
-                                        <p:cTn id="12" dur="1000"/>
+                                        <p:cTn id="12" dur="500"/>
                                         <p:tgtEl>
                                           <p:spTgt spid="4">
                                             <p:txEl>
@@ -6403,7 +6476,7 @@
                                     </p:set>
                                     <p:animEffect transition="in" filter="fade">
                                       <p:cBhvr>
-                                        <p:cTn id="17" dur="1000"/>
+                                        <p:cTn id="17" dur="500"/>
                                         <p:tgtEl>
                                           <p:spTgt spid="4">
                                             <p:txEl>
@@ -6464,7 +6537,7 @@
                                     </p:set>
                                     <p:animEffect transition="in" filter="fade">
                                       <p:cBhvr>
-                                        <p:cTn id="22" dur="1000"/>
+                                        <p:cTn id="22" dur="500"/>
                                         <p:tgtEl>
                                           <p:spTgt spid="4">
                                             <p:txEl>

</xml_diff>